<commit_message>
modified for 2-day workshop
</commit_message>
<xml_diff>
--- a/docs/Day 2 Slides.pptx
+++ b/docs/Day 2 Slides.pptx
@@ -223,7 +223,7 @@
           <a:p>
             <a:fld id="{C1BA31B9-3973-47BB-A769-C9355840A371}" type="datetimeFigureOut">
               <a:rPr lang="en-US" smtClean="0"/>
-              <a:t>7/21/17</a:t>
+              <a:t>5/21/18</a:t>
             </a:fld>
             <a:endParaRPr lang="en-US"/>
           </a:p>
@@ -687,7 +687,7 @@
           <a:p>
             <a:fld id="{90187E87-00B9-445A-8D49-C5EA21AFF997}" type="datetime1">
               <a:rPr lang="en-US" smtClean="0"/>
-              <a:t>7/21/17</a:t>
+              <a:t>5/21/18</a:t>
             </a:fld>
             <a:endParaRPr lang="en-US"/>
           </a:p>
@@ -908,7 +908,7 @@
           <a:p>
             <a:fld id="{096F9D19-0B27-4869-88F9-365098868A7F}" type="datetime1">
               <a:rPr lang="en-US" smtClean="0"/>
-              <a:t>7/21/17</a:t>
+              <a:t>5/21/18</a:t>
             </a:fld>
             <a:endParaRPr lang="en-US"/>
           </a:p>
@@ -1088,7 +1088,7 @@
           <a:p>
             <a:fld id="{AD3B7F37-9439-40A1-AEEF-AD67BB0D4AAC}" type="datetime1">
               <a:rPr lang="en-US" smtClean="0"/>
-              <a:t>7/21/17</a:t>
+              <a:t>5/21/18</a:t>
             </a:fld>
             <a:endParaRPr lang="en-US"/>
           </a:p>
@@ -1337,7 +1337,7 @@
             </a:pPr>
             <a:fld id="{68164054-3012-482D-9EB5-FE9FE872DCFE}" type="datetime1">
               <a:rPr lang="en-US" smtClean="0"/>
-              <a:t>7/21/17</a:t>
+              <a:t>5/21/18</a:t>
             </a:fld>
             <a:endParaRPr lang="en-US"/>
           </a:p>
@@ -1534,7 +1534,7 @@
           <a:p>
             <a:fld id="{6186BA2A-CEBF-4FAC-A01D-170852E3EB13}" type="datetime1">
               <a:rPr lang="en-US" smtClean="0"/>
-              <a:t>7/21/17</a:t>
+              <a:t>5/21/18</a:t>
             </a:fld>
             <a:endParaRPr lang="en-US"/>
           </a:p>
@@ -1792,7 +1792,7 @@
           <a:p>
             <a:fld id="{B5212E68-AB57-4F56-9514-81BEE86EE853}" type="datetime1">
               <a:rPr lang="en-US" smtClean="0"/>
-              <a:t>7/21/17</a:t>
+              <a:t>5/21/18</a:t>
             </a:fld>
             <a:endParaRPr lang="en-US"/>
           </a:p>
@@ -2115,7 +2115,7 @@
           <a:p>
             <a:fld id="{E41FD155-039D-4424-A31E-3636442F6E36}" type="datetime1">
               <a:rPr lang="en-US" smtClean="0"/>
-              <a:t>7/21/17</a:t>
+              <a:t>5/21/18</a:t>
             </a:fld>
             <a:endParaRPr lang="en-US"/>
           </a:p>
@@ -2539,7 +2539,7 @@
           <a:p>
             <a:fld id="{64126646-2279-486A-B40D-6145D7D6D51B}" type="datetime1">
               <a:rPr lang="en-US" smtClean="0"/>
-              <a:t>7/21/17</a:t>
+              <a:t>5/21/18</a:t>
             </a:fld>
             <a:endParaRPr lang="en-US"/>
           </a:p>
@@ -2657,7 +2657,7 @@
           <a:p>
             <a:fld id="{EB0B8D8C-4F8E-4FB9-992A-BE6AEAF72144}" type="datetime1">
               <a:rPr lang="en-US" smtClean="0"/>
-              <a:t>7/21/17</a:t>
+              <a:t>5/21/18</a:t>
             </a:fld>
             <a:endParaRPr lang="en-US"/>
           </a:p>
@@ -2752,7 +2752,7 @@
           <a:p>
             <a:fld id="{535ABF41-E07B-4A76-B381-06013911A931}" type="datetime1">
               <a:rPr lang="en-US" smtClean="0"/>
-              <a:t>7/21/17</a:t>
+              <a:t>5/21/18</a:t>
             </a:fld>
             <a:endParaRPr lang="en-US"/>
           </a:p>
@@ -3042,7 +3042,7 @@
           <a:p>
             <a:fld id="{6FC7F623-53E3-4FED-9930-39EA7732EA27}" type="datetime1">
               <a:rPr lang="en-US" smtClean="0"/>
-              <a:t>7/21/17</a:t>
+              <a:t>5/21/18</a:t>
             </a:fld>
             <a:endParaRPr lang="en-US"/>
           </a:p>
@@ -3314,7 +3314,7 @@
           <a:p>
             <a:fld id="{FA00CAC2-29F8-40CA-B143-AB13DA75749C}" type="datetime1">
               <a:rPr lang="en-US" smtClean="0"/>
-              <a:t>7/21/17</a:t>
+              <a:t>5/21/18</a:t>
             </a:fld>
             <a:endParaRPr lang="en-US"/>
           </a:p>
@@ -3568,7 +3568,7 @@
           <a:p>
             <a:fld id="{2E5D7971-9A78-471E-B993-894E22B9485D}" type="datetime1">
               <a:rPr lang="en-US" smtClean="0"/>
-              <a:t>7/21/17</a:t>
+              <a:t>5/21/18</a:t>
             </a:fld>
             <a:endParaRPr lang="en-US"/>
           </a:p>
@@ -6185,7 +6185,7 @@
               <a:buChar char="•"/>
             </a:pPr>
             <a:r>
-              <a:rPr lang="en-US" strike="sngStrike" dirty="0" smtClean="0"/>
+              <a:rPr lang="en-US" dirty="0" smtClean="0"/>
               <a:t>Preparing APA style manuscripts</a:t>
             </a:r>
           </a:p>

</xml_diff>

<commit_message>
update to intro and day 1 slides
</commit_message>
<xml_diff>
--- a/docs/Day 2 Slides.pptx
+++ b/docs/Day 2 Slides.pptx
@@ -223,7 +223,7 @@
           <a:p>
             <a:fld id="{C1BA31B9-3973-47BB-A769-C9355840A371}" type="datetimeFigureOut">
               <a:rPr lang="en-US" smtClean="0"/>
-              <a:t>5/21/18</a:t>
+              <a:t>5/22/18</a:t>
             </a:fld>
             <a:endParaRPr lang="en-US"/>
           </a:p>
@@ -687,7 +687,7 @@
           <a:p>
             <a:fld id="{90187E87-00B9-445A-8D49-C5EA21AFF997}" type="datetime1">
               <a:rPr lang="en-US" smtClean="0"/>
-              <a:t>5/21/18</a:t>
+              <a:t>5/22/18</a:t>
             </a:fld>
             <a:endParaRPr lang="en-US"/>
           </a:p>
@@ -908,7 +908,7 @@
           <a:p>
             <a:fld id="{096F9D19-0B27-4869-88F9-365098868A7F}" type="datetime1">
               <a:rPr lang="en-US" smtClean="0"/>
-              <a:t>5/21/18</a:t>
+              <a:t>5/22/18</a:t>
             </a:fld>
             <a:endParaRPr lang="en-US"/>
           </a:p>
@@ -1088,7 +1088,7 @@
           <a:p>
             <a:fld id="{AD3B7F37-9439-40A1-AEEF-AD67BB0D4AAC}" type="datetime1">
               <a:rPr lang="en-US" smtClean="0"/>
-              <a:t>5/21/18</a:t>
+              <a:t>5/22/18</a:t>
             </a:fld>
             <a:endParaRPr lang="en-US"/>
           </a:p>
@@ -1337,7 +1337,7 @@
             </a:pPr>
             <a:fld id="{68164054-3012-482D-9EB5-FE9FE872DCFE}" type="datetime1">
               <a:rPr lang="en-US" smtClean="0"/>
-              <a:t>5/21/18</a:t>
+              <a:t>5/22/18</a:t>
             </a:fld>
             <a:endParaRPr lang="en-US"/>
           </a:p>
@@ -1534,7 +1534,7 @@
           <a:p>
             <a:fld id="{6186BA2A-CEBF-4FAC-A01D-170852E3EB13}" type="datetime1">
               <a:rPr lang="en-US" smtClean="0"/>
-              <a:t>5/21/18</a:t>
+              <a:t>5/22/18</a:t>
             </a:fld>
             <a:endParaRPr lang="en-US"/>
           </a:p>
@@ -1792,7 +1792,7 @@
           <a:p>
             <a:fld id="{B5212E68-AB57-4F56-9514-81BEE86EE853}" type="datetime1">
               <a:rPr lang="en-US" smtClean="0"/>
-              <a:t>5/21/18</a:t>
+              <a:t>5/22/18</a:t>
             </a:fld>
             <a:endParaRPr lang="en-US"/>
           </a:p>
@@ -2115,7 +2115,7 @@
           <a:p>
             <a:fld id="{E41FD155-039D-4424-A31E-3636442F6E36}" type="datetime1">
               <a:rPr lang="en-US" smtClean="0"/>
-              <a:t>5/21/18</a:t>
+              <a:t>5/22/18</a:t>
             </a:fld>
             <a:endParaRPr lang="en-US"/>
           </a:p>
@@ -2539,7 +2539,7 @@
           <a:p>
             <a:fld id="{64126646-2279-486A-B40D-6145D7D6D51B}" type="datetime1">
               <a:rPr lang="en-US" smtClean="0"/>
-              <a:t>5/21/18</a:t>
+              <a:t>5/22/18</a:t>
             </a:fld>
             <a:endParaRPr lang="en-US"/>
           </a:p>
@@ -2657,7 +2657,7 @@
           <a:p>
             <a:fld id="{EB0B8D8C-4F8E-4FB9-992A-BE6AEAF72144}" type="datetime1">
               <a:rPr lang="en-US" smtClean="0"/>
-              <a:t>5/21/18</a:t>
+              <a:t>5/22/18</a:t>
             </a:fld>
             <a:endParaRPr lang="en-US"/>
           </a:p>
@@ -2752,7 +2752,7 @@
           <a:p>
             <a:fld id="{535ABF41-E07B-4A76-B381-06013911A931}" type="datetime1">
               <a:rPr lang="en-US" smtClean="0"/>
-              <a:t>5/21/18</a:t>
+              <a:t>5/22/18</a:t>
             </a:fld>
             <a:endParaRPr lang="en-US"/>
           </a:p>
@@ -3042,7 +3042,7 @@
           <a:p>
             <a:fld id="{6FC7F623-53E3-4FED-9930-39EA7732EA27}" type="datetime1">
               <a:rPr lang="en-US" smtClean="0"/>
-              <a:t>5/21/18</a:t>
+              <a:t>5/22/18</a:t>
             </a:fld>
             <a:endParaRPr lang="en-US"/>
           </a:p>
@@ -3314,7 +3314,7 @@
           <a:p>
             <a:fld id="{FA00CAC2-29F8-40CA-B143-AB13DA75749C}" type="datetime1">
               <a:rPr lang="en-US" smtClean="0"/>
-              <a:t>5/21/18</a:t>
+              <a:t>5/22/18</a:t>
             </a:fld>
             <a:endParaRPr lang="en-US"/>
           </a:p>
@@ -3568,7 +3568,7 @@
           <a:p>
             <a:fld id="{2E5D7971-9A78-471E-B993-894E22B9485D}" type="datetime1">
               <a:rPr lang="en-US" smtClean="0"/>
-              <a:t>5/21/18</a:t>
+              <a:t>5/22/18</a:t>
             </a:fld>
             <a:endParaRPr lang="en-US"/>
           </a:p>
@@ -4128,6 +4128,36 @@
           </a:p>
         </p:txBody>
       </p:sp>
+      <p:pic>
+        <p:nvPicPr>
+          <p:cNvPr id="4" name="Picture 3"/>
+          <p:cNvPicPr>
+            <a:picLocks noChangeAspect="1"/>
+          </p:cNvPicPr>
+          <p:nvPr/>
+        </p:nvPicPr>
+        <p:blipFill>
+          <a:blip r:embed="rId2">
+            <a:extLst>
+              <a:ext uri="{28A0092B-C50C-407E-A947-70E740481C1C}">
+                <a14:useLocalDpi xmlns:a14="http://schemas.microsoft.com/office/drawing/2010/main" val="0"/>
+              </a:ext>
+            </a:extLst>
+          </a:blip>
+          <a:stretch>
+            <a:fillRect/>
+          </a:stretch>
+        </p:blipFill>
+        <p:spPr>
+          <a:xfrm>
+            <a:off x="9729216" y="5715000"/>
+            <a:ext cx="2073656" cy="681914"/>
+          </a:xfrm>
+          <a:prstGeom prst="rect">
+            <a:avLst/>
+          </a:prstGeom>
+        </p:spPr>
+      </p:pic>
     </p:spTree>
     <p:extLst>
       <p:ext uri="{BB962C8B-B14F-4D97-AF65-F5344CB8AC3E}">

</xml_diff>

<commit_message>
slides and cover sheets
</commit_message>
<xml_diff>
--- a/docs/Day 2 Slides.pptx
+++ b/docs/Day 2 Slides.pptx
@@ -223,7 +223,7 @@
           <a:p>
             <a:fld id="{C1BA31B9-3973-47BB-A769-C9355840A371}" type="datetimeFigureOut">
               <a:rPr lang="en-US" smtClean="0"/>
-              <a:t>5/22/18</a:t>
+              <a:t>5/27/18</a:t>
             </a:fld>
             <a:endParaRPr lang="en-US"/>
           </a:p>
@@ -287,38 +287,37 @@
           <a:p>
             <a:pPr lvl="0"/>
             <a:r>
-              <a:rPr lang="en-US" smtClean="0"/>
+              <a:rPr lang="en-US"/>
               <a:t>Click to edit Master text styles</a:t>
             </a:r>
           </a:p>
           <a:p>
             <a:pPr lvl="1"/>
             <a:r>
-              <a:rPr lang="en-US" smtClean="0"/>
+              <a:rPr lang="en-US"/>
               <a:t>Second level</a:t>
             </a:r>
           </a:p>
           <a:p>
             <a:pPr lvl="2"/>
             <a:r>
-              <a:rPr lang="en-US" smtClean="0"/>
+              <a:rPr lang="en-US"/>
               <a:t>Third level</a:t>
             </a:r>
           </a:p>
           <a:p>
             <a:pPr lvl="3"/>
             <a:r>
-              <a:rPr lang="en-US" smtClean="0"/>
+              <a:rPr lang="en-US"/>
               <a:t>Fourth level</a:t>
             </a:r>
           </a:p>
           <a:p>
             <a:pPr lvl="4"/>
             <a:r>
-              <a:rPr lang="en-US" smtClean="0"/>
+              <a:rPr lang="en-US"/>
               <a:t>Fifth level</a:t>
             </a:r>
-            <a:endParaRPr lang="en-US"/>
           </a:p>
         </p:txBody>
       </p:sp>
@@ -584,7 +583,7 @@
           </a:lstStyle>
           <a:p>
             <a:r>
-              <a:rPr lang="en-US" smtClean="0"/>
+              <a:rPr lang="en-US"/>
               <a:t>Click to edit Master title style</a:t>
             </a:r>
             <a:endParaRPr lang="en-US" dirty="0"/>
@@ -655,7 +654,7 @@
           </a:lstStyle>
           <a:p>
             <a:r>
-              <a:rPr lang="en-US" smtClean="0"/>
+              <a:rPr lang="en-US"/>
               <a:t>Click to edit Master subtitle style</a:t>
             </a:r>
             <a:endParaRPr lang="en-US" dirty="0"/>
@@ -687,7 +686,7 @@
           <a:p>
             <a:fld id="{90187E87-00B9-445A-8D49-C5EA21AFF997}" type="datetime1">
               <a:rPr lang="en-US" smtClean="0"/>
-              <a:t>5/22/18</a:t>
+              <a:t>5/27/18</a:t>
             </a:fld>
             <a:endParaRPr lang="en-US"/>
           </a:p>
@@ -832,7 +831,7 @@
           <a:lstStyle/>
           <a:p>
             <a:r>
-              <a:rPr lang="en-US" smtClean="0"/>
+              <a:rPr lang="en-US"/>
               <a:t>Click to edit Master title style</a:t>
             </a:r>
             <a:endParaRPr lang="en-US" dirty="0"/>
@@ -856,35 +855,35 @@
           <a:p>
             <a:pPr lvl="0"/>
             <a:r>
-              <a:rPr lang="en-US" smtClean="0"/>
+              <a:rPr lang="en-US"/>
               <a:t>Click to edit Master text styles</a:t>
             </a:r>
           </a:p>
           <a:p>
             <a:pPr lvl="1"/>
             <a:r>
-              <a:rPr lang="en-US" smtClean="0"/>
+              <a:rPr lang="en-US"/>
               <a:t>Second level</a:t>
             </a:r>
           </a:p>
           <a:p>
             <a:pPr lvl="2"/>
             <a:r>
-              <a:rPr lang="en-US" smtClean="0"/>
+              <a:rPr lang="en-US"/>
               <a:t>Third level</a:t>
             </a:r>
           </a:p>
           <a:p>
             <a:pPr lvl="3"/>
             <a:r>
-              <a:rPr lang="en-US" smtClean="0"/>
+              <a:rPr lang="en-US"/>
               <a:t>Fourth level</a:t>
             </a:r>
           </a:p>
           <a:p>
             <a:pPr lvl="4"/>
             <a:r>
-              <a:rPr lang="en-US" smtClean="0"/>
+              <a:rPr lang="en-US"/>
               <a:t>Fifth level</a:t>
             </a:r>
             <a:endParaRPr lang="en-US" dirty="0"/>
@@ -908,7 +907,7 @@
           <a:p>
             <a:fld id="{096F9D19-0B27-4869-88F9-365098868A7F}" type="datetime1">
               <a:rPr lang="en-US" smtClean="0"/>
-              <a:t>5/22/18</a:t>
+              <a:t>5/27/18</a:t>
             </a:fld>
             <a:endParaRPr lang="en-US"/>
           </a:p>
@@ -1007,7 +1006,7 @@
           <a:lstStyle/>
           <a:p>
             <a:r>
-              <a:rPr lang="en-US" smtClean="0"/>
+              <a:rPr lang="en-US"/>
               <a:t>Click to edit Master title style</a:t>
             </a:r>
             <a:endParaRPr lang="en-US" dirty="0"/>
@@ -1036,35 +1035,35 @@
           <a:p>
             <a:pPr lvl="0"/>
             <a:r>
-              <a:rPr lang="en-US" smtClean="0"/>
+              <a:rPr lang="en-US"/>
               <a:t>Click to edit Master text styles</a:t>
             </a:r>
           </a:p>
           <a:p>
             <a:pPr lvl="1"/>
             <a:r>
-              <a:rPr lang="en-US" smtClean="0"/>
+              <a:rPr lang="en-US"/>
               <a:t>Second level</a:t>
             </a:r>
           </a:p>
           <a:p>
             <a:pPr lvl="2"/>
             <a:r>
-              <a:rPr lang="en-US" smtClean="0"/>
+              <a:rPr lang="en-US"/>
               <a:t>Third level</a:t>
             </a:r>
           </a:p>
           <a:p>
             <a:pPr lvl="3"/>
             <a:r>
-              <a:rPr lang="en-US" smtClean="0"/>
+              <a:rPr lang="en-US"/>
               <a:t>Fourth level</a:t>
             </a:r>
           </a:p>
           <a:p>
             <a:pPr lvl="4"/>
             <a:r>
-              <a:rPr lang="en-US" smtClean="0"/>
+              <a:rPr lang="en-US"/>
               <a:t>Fifth level</a:t>
             </a:r>
             <a:endParaRPr lang="en-US" dirty="0"/>
@@ -1088,7 +1087,7 @@
           <a:p>
             <a:fld id="{AD3B7F37-9439-40A1-AEEF-AD67BB0D4AAC}" type="datetime1">
               <a:rPr lang="en-US" smtClean="0"/>
-              <a:t>5/22/18</a:t>
+              <a:t>5/27/18</a:t>
             </a:fld>
             <a:endParaRPr lang="en-US"/>
           </a:p>
@@ -1187,10 +1186,9 @@
           <a:lstStyle/>
           <a:p>
             <a:r>
-              <a:rPr lang="en-US" smtClean="0"/>
+              <a:rPr lang="en-US"/>
               <a:t>Click to edit Master title style</a:t>
             </a:r>
-            <a:endParaRPr lang="en-US"/>
           </a:p>
         </p:txBody>
       </p:sp>
@@ -1216,38 +1214,37 @@
           <a:p>
             <a:pPr lvl="0"/>
             <a:r>
-              <a:rPr lang="en-US" smtClean="0"/>
+              <a:rPr lang="en-US"/>
               <a:t>Click to edit Master text styles</a:t>
             </a:r>
           </a:p>
           <a:p>
             <a:pPr lvl="1"/>
             <a:r>
-              <a:rPr lang="en-US" smtClean="0"/>
+              <a:rPr lang="en-US"/>
               <a:t>Second level</a:t>
             </a:r>
           </a:p>
           <a:p>
             <a:pPr lvl="2"/>
             <a:r>
-              <a:rPr lang="en-US" smtClean="0"/>
+              <a:rPr lang="en-US"/>
               <a:t>Third level</a:t>
             </a:r>
           </a:p>
           <a:p>
             <a:pPr lvl="3"/>
             <a:r>
-              <a:rPr lang="en-US" smtClean="0"/>
+              <a:rPr lang="en-US"/>
               <a:t>Fourth level</a:t>
             </a:r>
           </a:p>
           <a:p>
             <a:pPr lvl="4"/>
             <a:r>
-              <a:rPr lang="en-US" smtClean="0"/>
+              <a:rPr lang="en-US"/>
               <a:t>Fifth level</a:t>
             </a:r>
-            <a:endParaRPr lang="en-US"/>
           </a:p>
         </p:txBody>
       </p:sp>
@@ -1273,38 +1270,37 @@
           <a:p>
             <a:pPr lvl="0"/>
             <a:r>
-              <a:rPr lang="en-US" smtClean="0"/>
+              <a:rPr lang="en-US"/>
               <a:t>Click to edit Master text styles</a:t>
             </a:r>
           </a:p>
           <a:p>
             <a:pPr lvl="1"/>
             <a:r>
-              <a:rPr lang="en-US" smtClean="0"/>
+              <a:rPr lang="en-US"/>
               <a:t>Second level</a:t>
             </a:r>
           </a:p>
           <a:p>
             <a:pPr lvl="2"/>
             <a:r>
-              <a:rPr lang="en-US" smtClean="0"/>
+              <a:rPr lang="en-US"/>
               <a:t>Third level</a:t>
             </a:r>
           </a:p>
           <a:p>
             <a:pPr lvl="3"/>
             <a:r>
-              <a:rPr lang="en-US" smtClean="0"/>
+              <a:rPr lang="en-US"/>
               <a:t>Fourth level</a:t>
             </a:r>
           </a:p>
           <a:p>
             <a:pPr lvl="4"/>
             <a:r>
-              <a:rPr lang="en-US" smtClean="0"/>
+              <a:rPr lang="en-US"/>
               <a:t>Fifth level</a:t>
             </a:r>
-            <a:endParaRPr lang="en-US"/>
           </a:p>
         </p:txBody>
       </p:sp>
@@ -1337,7 +1333,7 @@
             </a:pPr>
             <a:fld id="{68164054-3012-482D-9EB5-FE9FE872DCFE}" type="datetime1">
               <a:rPr lang="en-US" smtClean="0"/>
-              <a:t>5/22/18</a:t>
+              <a:t>5/27/18</a:t>
             </a:fld>
             <a:endParaRPr lang="en-US"/>
           </a:p>
@@ -1458,7 +1454,7 @@
           <a:lstStyle/>
           <a:p>
             <a:r>
-              <a:rPr lang="en-US" smtClean="0"/>
+              <a:rPr lang="en-US"/>
               <a:t>Click to edit Master title style</a:t>
             </a:r>
             <a:endParaRPr lang="en-US" dirty="0"/>
@@ -1482,35 +1478,35 @@
           <a:p>
             <a:pPr lvl="0"/>
             <a:r>
-              <a:rPr lang="en-US" smtClean="0"/>
+              <a:rPr lang="en-US"/>
               <a:t>Click to edit Master text styles</a:t>
             </a:r>
           </a:p>
           <a:p>
             <a:pPr lvl="1"/>
             <a:r>
-              <a:rPr lang="en-US" smtClean="0"/>
+              <a:rPr lang="en-US"/>
               <a:t>Second level</a:t>
             </a:r>
           </a:p>
           <a:p>
             <a:pPr lvl="2"/>
             <a:r>
-              <a:rPr lang="en-US" smtClean="0"/>
+              <a:rPr lang="en-US"/>
               <a:t>Third level</a:t>
             </a:r>
           </a:p>
           <a:p>
             <a:pPr lvl="3"/>
             <a:r>
-              <a:rPr lang="en-US" smtClean="0"/>
+              <a:rPr lang="en-US"/>
               <a:t>Fourth level</a:t>
             </a:r>
           </a:p>
           <a:p>
             <a:pPr lvl="4"/>
             <a:r>
-              <a:rPr lang="en-US" smtClean="0"/>
+              <a:rPr lang="en-US"/>
               <a:t>Fifth level</a:t>
             </a:r>
             <a:endParaRPr lang="en-US" dirty="0"/>
@@ -1534,7 +1530,7 @@
           <a:p>
             <a:fld id="{6186BA2A-CEBF-4FAC-A01D-170852E3EB13}" type="datetime1">
               <a:rPr lang="en-US" smtClean="0"/>
-              <a:t>5/22/18</a:t>
+              <a:t>5/27/18</a:t>
             </a:fld>
             <a:endParaRPr lang="en-US"/>
           </a:p>
@@ -1592,13 +1588,6 @@
   <p:clrMapOvr>
     <a:masterClrMapping/>
   </p:clrMapOvr>
-  <p:timing>
-    <p:tnLst>
-      <p:par>
-        <p:cTn id="1" dur="indefinite" restart="never" nodeType="tmRoot"/>
-      </p:par>
-    </p:tnLst>
-  </p:timing>
 </p:sldLayout>
 </file>
 
@@ -1649,7 +1638,7 @@
           </a:lstStyle>
           <a:p>
             <a:r>
-              <a:rPr lang="en-US" smtClean="0"/>
+              <a:rPr lang="en-US"/>
               <a:t>Click to edit Master title style</a:t>
             </a:r>
             <a:endParaRPr lang="en-US" dirty="0"/>
@@ -1769,7 +1758,7 @@
           <a:p>
             <a:pPr lvl="0"/>
             <a:r>
-              <a:rPr lang="en-US" smtClean="0"/>
+              <a:rPr lang="en-US"/>
               <a:t>Click to edit Master text styles</a:t>
             </a:r>
           </a:p>
@@ -1792,7 +1781,7 @@
           <a:p>
             <a:fld id="{B5212E68-AB57-4F56-9514-81BEE86EE853}" type="datetime1">
               <a:rPr lang="en-US" smtClean="0"/>
-              <a:t>5/22/18</a:t>
+              <a:t>5/27/18</a:t>
             </a:fld>
             <a:endParaRPr lang="en-US"/>
           </a:p>
@@ -1921,7 +1910,7 @@
           <a:lstStyle/>
           <a:p>
             <a:r>
-              <a:rPr lang="en-US" smtClean="0"/>
+              <a:rPr lang="en-US"/>
               <a:t>Click to edit Master title style</a:t>
             </a:r>
             <a:endParaRPr lang="en-US" dirty="0"/>
@@ -1978,35 +1967,35 @@
           <a:p>
             <a:pPr lvl="0"/>
             <a:r>
-              <a:rPr lang="en-US" smtClean="0"/>
+              <a:rPr lang="en-US"/>
               <a:t>Click to edit Master text styles</a:t>
             </a:r>
           </a:p>
           <a:p>
             <a:pPr lvl="1"/>
             <a:r>
-              <a:rPr lang="en-US" smtClean="0"/>
+              <a:rPr lang="en-US"/>
               <a:t>Second level</a:t>
             </a:r>
           </a:p>
           <a:p>
             <a:pPr lvl="2"/>
             <a:r>
-              <a:rPr lang="en-US" smtClean="0"/>
+              <a:rPr lang="en-US"/>
               <a:t>Third level</a:t>
             </a:r>
           </a:p>
           <a:p>
             <a:pPr lvl="3"/>
             <a:r>
-              <a:rPr lang="en-US" smtClean="0"/>
+              <a:rPr lang="en-US"/>
               <a:t>Fourth level</a:t>
             </a:r>
           </a:p>
           <a:p>
             <a:pPr lvl="4"/>
             <a:r>
-              <a:rPr lang="en-US" smtClean="0"/>
+              <a:rPr lang="en-US"/>
               <a:t>Fifth level</a:t>
             </a:r>
             <a:endParaRPr lang="en-US" dirty="0"/>
@@ -2063,35 +2052,35 @@
           <a:p>
             <a:pPr lvl="0"/>
             <a:r>
-              <a:rPr lang="en-US" smtClean="0"/>
+              <a:rPr lang="en-US"/>
               <a:t>Click to edit Master text styles</a:t>
             </a:r>
           </a:p>
           <a:p>
             <a:pPr lvl="1"/>
             <a:r>
-              <a:rPr lang="en-US" smtClean="0"/>
+              <a:rPr lang="en-US"/>
               <a:t>Second level</a:t>
             </a:r>
           </a:p>
           <a:p>
             <a:pPr lvl="2"/>
             <a:r>
-              <a:rPr lang="en-US" smtClean="0"/>
+              <a:rPr lang="en-US"/>
               <a:t>Third level</a:t>
             </a:r>
           </a:p>
           <a:p>
             <a:pPr lvl="3"/>
             <a:r>
-              <a:rPr lang="en-US" smtClean="0"/>
+              <a:rPr lang="en-US"/>
               <a:t>Fourth level</a:t>
             </a:r>
           </a:p>
           <a:p>
             <a:pPr lvl="4"/>
             <a:r>
-              <a:rPr lang="en-US" smtClean="0"/>
+              <a:rPr lang="en-US"/>
               <a:t>Fifth level</a:t>
             </a:r>
             <a:endParaRPr lang="en-US" dirty="0"/>
@@ -2115,7 +2104,7 @@
           <a:p>
             <a:fld id="{E41FD155-039D-4424-A31E-3636442F6E36}" type="datetime1">
               <a:rPr lang="en-US" smtClean="0"/>
-              <a:t>5/22/18</a:t>
+              <a:t>5/27/18</a:t>
             </a:fld>
             <a:endParaRPr lang="en-US"/>
           </a:p>
@@ -2209,7 +2198,7 @@
           <a:lstStyle/>
           <a:p>
             <a:r>
-              <a:rPr lang="en-US" smtClean="0"/>
+              <a:rPr lang="en-US"/>
               <a:t>Click to edit Master title style</a:t>
             </a:r>
             <a:endParaRPr lang="en-US" dirty="0"/>
@@ -2278,7 +2267,7 @@
           <a:p>
             <a:pPr lvl="0"/>
             <a:r>
-              <a:rPr lang="en-US" smtClean="0"/>
+              <a:rPr lang="en-US"/>
               <a:t>Click to edit Master text styles</a:t>
             </a:r>
           </a:p>
@@ -2334,35 +2323,35 @@
           <a:p>
             <a:pPr lvl="0"/>
             <a:r>
-              <a:rPr lang="en-US" smtClean="0"/>
+              <a:rPr lang="en-US"/>
               <a:t>Click to edit Master text styles</a:t>
             </a:r>
           </a:p>
           <a:p>
             <a:pPr lvl="1"/>
             <a:r>
-              <a:rPr lang="en-US" smtClean="0"/>
+              <a:rPr lang="en-US"/>
               <a:t>Second level</a:t>
             </a:r>
           </a:p>
           <a:p>
             <a:pPr lvl="2"/>
             <a:r>
-              <a:rPr lang="en-US" smtClean="0"/>
+              <a:rPr lang="en-US"/>
               <a:t>Third level</a:t>
             </a:r>
           </a:p>
           <a:p>
             <a:pPr lvl="3"/>
             <a:r>
-              <a:rPr lang="en-US" smtClean="0"/>
+              <a:rPr lang="en-US"/>
               <a:t>Fourth level</a:t>
             </a:r>
           </a:p>
           <a:p>
             <a:pPr lvl="4"/>
             <a:r>
-              <a:rPr lang="en-US" smtClean="0"/>
+              <a:rPr lang="en-US"/>
               <a:t>Fifth level</a:t>
             </a:r>
             <a:endParaRPr lang="en-US" dirty="0"/>
@@ -2431,7 +2420,7 @@
           <a:p>
             <a:pPr lvl="0"/>
             <a:r>
-              <a:rPr lang="en-US" smtClean="0"/>
+              <a:rPr lang="en-US"/>
               <a:t>Click to edit Master text styles</a:t>
             </a:r>
           </a:p>
@@ -2487,35 +2476,35 @@
           <a:p>
             <a:pPr lvl="0"/>
             <a:r>
-              <a:rPr lang="en-US" smtClean="0"/>
+              <a:rPr lang="en-US"/>
               <a:t>Click to edit Master text styles</a:t>
             </a:r>
           </a:p>
           <a:p>
             <a:pPr lvl="1"/>
             <a:r>
-              <a:rPr lang="en-US" smtClean="0"/>
+              <a:rPr lang="en-US"/>
               <a:t>Second level</a:t>
             </a:r>
           </a:p>
           <a:p>
             <a:pPr lvl="2"/>
             <a:r>
-              <a:rPr lang="en-US" smtClean="0"/>
+              <a:rPr lang="en-US"/>
               <a:t>Third level</a:t>
             </a:r>
           </a:p>
           <a:p>
             <a:pPr lvl="3"/>
             <a:r>
-              <a:rPr lang="en-US" smtClean="0"/>
+              <a:rPr lang="en-US"/>
               <a:t>Fourth level</a:t>
             </a:r>
           </a:p>
           <a:p>
             <a:pPr lvl="4"/>
             <a:r>
-              <a:rPr lang="en-US" smtClean="0"/>
+              <a:rPr lang="en-US"/>
               <a:t>Fifth level</a:t>
             </a:r>
             <a:endParaRPr lang="en-US" dirty="0"/>
@@ -2539,7 +2528,7 @@
           <a:p>
             <a:fld id="{64126646-2279-486A-B40D-6145D7D6D51B}" type="datetime1">
               <a:rPr lang="en-US" smtClean="0"/>
-              <a:t>5/22/18</a:t>
+              <a:t>5/27/18</a:t>
             </a:fld>
             <a:endParaRPr lang="en-US"/>
           </a:p>
@@ -2633,7 +2622,7 @@
           <a:lstStyle/>
           <a:p>
             <a:r>
-              <a:rPr lang="en-US" smtClean="0"/>
+              <a:rPr lang="en-US"/>
               <a:t>Click to edit Master title style</a:t>
             </a:r>
             <a:endParaRPr lang="en-US" dirty="0"/>
@@ -2657,7 +2646,7 @@
           <a:p>
             <a:fld id="{EB0B8D8C-4F8E-4FB9-992A-BE6AEAF72144}" type="datetime1">
               <a:rPr lang="en-US" smtClean="0"/>
-              <a:t>5/22/18</a:t>
+              <a:t>5/27/18</a:t>
             </a:fld>
             <a:endParaRPr lang="en-US"/>
           </a:p>
@@ -2752,7 +2741,7 @@
           <a:p>
             <a:fld id="{535ABF41-E07B-4A76-B381-06013911A931}" type="datetime1">
               <a:rPr lang="en-US" smtClean="0"/>
-              <a:t>5/22/18</a:t>
+              <a:t>5/27/18</a:t>
             </a:fld>
             <a:endParaRPr lang="en-US"/>
           </a:p>
@@ -2860,7 +2849,7 @@
           </a:lstStyle>
           <a:p>
             <a:r>
-              <a:rPr lang="en-US" smtClean="0"/>
+              <a:rPr lang="en-US"/>
               <a:t>Click to edit Master title style</a:t>
             </a:r>
             <a:endParaRPr lang="en-US" dirty="0"/>
@@ -2917,35 +2906,35 @@
           <a:p>
             <a:pPr lvl="0"/>
             <a:r>
-              <a:rPr lang="en-US" smtClean="0"/>
+              <a:rPr lang="en-US"/>
               <a:t>Click to edit Master text styles</a:t>
             </a:r>
           </a:p>
           <a:p>
             <a:pPr lvl="1"/>
             <a:r>
-              <a:rPr lang="en-US" smtClean="0"/>
+              <a:rPr lang="en-US"/>
               <a:t>Second level</a:t>
             </a:r>
           </a:p>
           <a:p>
             <a:pPr lvl="2"/>
             <a:r>
-              <a:rPr lang="en-US" smtClean="0"/>
+              <a:rPr lang="en-US"/>
               <a:t>Third level</a:t>
             </a:r>
           </a:p>
           <a:p>
             <a:pPr lvl="3"/>
             <a:r>
-              <a:rPr lang="en-US" smtClean="0"/>
+              <a:rPr lang="en-US"/>
               <a:t>Fourth level</a:t>
             </a:r>
           </a:p>
           <a:p>
             <a:pPr lvl="4"/>
             <a:r>
-              <a:rPr lang="en-US" smtClean="0"/>
+              <a:rPr lang="en-US"/>
               <a:t>Fifth level</a:t>
             </a:r>
             <a:endParaRPr lang="en-US" dirty="0"/>
@@ -3019,7 +3008,7 @@
           <a:p>
             <a:pPr lvl="0"/>
             <a:r>
-              <a:rPr lang="en-US" smtClean="0"/>
+              <a:rPr lang="en-US"/>
               <a:t>Click to edit Master text styles</a:t>
             </a:r>
           </a:p>
@@ -3042,7 +3031,7 @@
           <a:p>
             <a:fld id="{6FC7F623-53E3-4FED-9930-39EA7732EA27}" type="datetime1">
               <a:rPr lang="en-US" smtClean="0"/>
-              <a:t>5/22/18</a:t>
+              <a:t>5/27/18</a:t>
             </a:fld>
             <a:endParaRPr lang="en-US"/>
           </a:p>
@@ -3150,7 +3139,7 @@
           </a:lstStyle>
           <a:p>
             <a:r>
-              <a:rPr lang="en-US" smtClean="0"/>
+              <a:rPr lang="en-US"/>
               <a:t>Click to edit Master title style</a:t>
             </a:r>
             <a:endParaRPr lang="en-US" dirty="0"/>
@@ -3217,7 +3206,7 @@
           </a:lstStyle>
           <a:p>
             <a:r>
-              <a:rPr lang="en-US" smtClean="0"/>
+              <a:rPr lang="en-US"/>
               <a:t>Click icon to add picture</a:t>
             </a:r>
             <a:endParaRPr lang="en-US" dirty="0"/>
@@ -3291,7 +3280,7 @@
           <a:p>
             <a:pPr lvl="0"/>
             <a:r>
-              <a:rPr lang="en-US" smtClean="0"/>
+              <a:rPr lang="en-US"/>
               <a:t>Click to edit Master text styles</a:t>
             </a:r>
           </a:p>
@@ -3314,7 +3303,7 @@
           <a:p>
             <a:fld id="{FA00CAC2-29F8-40CA-B143-AB13DA75749C}" type="datetime1">
               <a:rPr lang="en-US" smtClean="0"/>
-              <a:t>5/22/18</a:t>
+              <a:t>5/27/18</a:t>
             </a:fld>
             <a:endParaRPr lang="en-US"/>
           </a:p>
@@ -3466,7 +3455,7 @@
           <a:lstStyle/>
           <a:p>
             <a:r>
-              <a:rPr lang="en-US" smtClean="0"/>
+              <a:rPr lang="en-US"/>
               <a:t>Click to edit Master title style</a:t>
             </a:r>
             <a:endParaRPr lang="en-US" dirty="0"/>
@@ -3500,35 +3489,35 @@
           <a:p>
             <a:pPr lvl="0"/>
             <a:r>
-              <a:rPr lang="en-US" smtClean="0"/>
+              <a:rPr lang="en-US"/>
               <a:t>Click to edit Master text styles</a:t>
             </a:r>
           </a:p>
           <a:p>
             <a:pPr lvl="1"/>
             <a:r>
-              <a:rPr lang="en-US" smtClean="0"/>
+              <a:rPr lang="en-US"/>
               <a:t>Second level</a:t>
             </a:r>
           </a:p>
           <a:p>
             <a:pPr lvl="2"/>
             <a:r>
-              <a:rPr lang="en-US" smtClean="0"/>
+              <a:rPr lang="en-US"/>
               <a:t>Third level</a:t>
             </a:r>
           </a:p>
           <a:p>
             <a:pPr lvl="3"/>
             <a:r>
-              <a:rPr lang="en-US" smtClean="0"/>
+              <a:rPr lang="en-US"/>
               <a:t>Fourth level</a:t>
             </a:r>
           </a:p>
           <a:p>
             <a:pPr lvl="4"/>
             <a:r>
-              <a:rPr lang="en-US" smtClean="0"/>
+              <a:rPr lang="en-US"/>
               <a:t>Fifth level</a:t>
             </a:r>
             <a:endParaRPr lang="en-US" dirty="0"/>
@@ -3568,7 +3557,7 @@
           <a:p>
             <a:fld id="{2E5D7971-9A78-471E-B993-894E22B9485D}" type="datetime1">
               <a:rPr lang="en-US" smtClean="0"/>
-              <a:t>5/22/18</a:t>
+              <a:t>5/27/18</a:t>
             </a:fld>
             <a:endParaRPr lang="en-US"/>
           </a:p>
@@ -4047,25 +4036,24 @@
           <a:lstStyle/>
           <a:p>
             <a:r>
-              <a:rPr lang="en-US" dirty="0" smtClean="0"/>
+              <a:rPr lang="en-US" dirty="0"/>
               <a:t>R Workshop </a:t>
             </a:r>
             <a:r>
-              <a:rPr lang="mr-IN" dirty="0" smtClean="0"/>
+              <a:rPr lang="mr-IN" dirty="0"/>
               <a:t>–</a:t>
             </a:r>
             <a:r>
-              <a:rPr lang="en-US" dirty="0" smtClean="0"/>
+              <a:rPr lang="en-US" dirty="0"/>
               <a:t> </a:t>
             </a:r>
             <a:br>
-              <a:rPr lang="en-US" dirty="0" smtClean="0"/>
+              <a:rPr lang="en-US" dirty="0"/>
             </a:br>
             <a:r>
-              <a:rPr lang="en-US" dirty="0" smtClean="0"/>
+              <a:rPr lang="en-US" dirty="0"/>
               <a:t>Day 2</a:t>
             </a:r>
-            <a:endParaRPr lang="en-US" dirty="0"/>
           </a:p>
         </p:txBody>
       </p:sp>
@@ -4085,46 +4073,45 @@
           <a:lstStyle/>
           <a:p>
             <a:r>
-              <a:rPr lang="en-US" dirty="0" smtClean="0"/>
+              <a:rPr lang="en-US" dirty="0"/>
               <a:t>Randi L. Garcia</a:t>
             </a:r>
           </a:p>
           <a:p>
             <a:r>
-              <a:rPr lang="en-US" dirty="0" smtClean="0"/>
+              <a:rPr lang="en-US" dirty="0"/>
               <a:t>Smith College</a:t>
             </a:r>
           </a:p>
           <a:p>
             <a:r>
-              <a:rPr lang="en-US" dirty="0" smtClean="0"/>
+              <a:rPr lang="en-US" dirty="0"/>
               <a:t>July 17</a:t>
             </a:r>
             <a:r>
-              <a:rPr lang="en-US" baseline="30000" dirty="0" smtClean="0"/>
+              <a:rPr lang="en-US" baseline="30000" dirty="0"/>
               <a:t>th</a:t>
             </a:r>
             <a:r>
-              <a:rPr lang="en-US" dirty="0" smtClean="0"/>
+              <a:rPr lang="en-US" dirty="0"/>
               <a:t>, 19</a:t>
             </a:r>
             <a:r>
-              <a:rPr lang="en-US" baseline="30000" dirty="0" smtClean="0"/>
+              <a:rPr lang="en-US" baseline="30000" dirty="0"/>
               <a:t>th</a:t>
             </a:r>
             <a:r>
-              <a:rPr lang="en-US" dirty="0" smtClean="0"/>
+              <a:rPr lang="en-US" dirty="0"/>
               <a:t>, and 21</a:t>
             </a:r>
             <a:r>
-              <a:rPr lang="en-US" baseline="30000" dirty="0" smtClean="0"/>
+              <a:rPr lang="en-US" baseline="30000" dirty="0"/>
               <a:t>st</a:t>
             </a:r>
             <a:r>
-              <a:rPr lang="en-US" dirty="0" smtClean="0"/>
+              <a:rPr lang="en-US" dirty="0"/>
               <a:t> </a:t>
             </a:r>
-            <a:endParaRPr lang="en-US" dirty="0"/>
           </a:p>
         </p:txBody>
       </p:sp>
@@ -4168,13 +4155,6 @@
   <p:clrMapOvr>
     <a:masterClrMapping/>
   </p:clrMapOvr>
-  <p:timing>
-    <p:tnLst>
-      <p:par>
-        <p:cTn id="1" dur="indefinite" restart="never" nodeType="tmRoot"/>
-      </p:par>
-    </p:tnLst>
-  </p:timing>
 </p:sld>
 </file>
 
@@ -4211,10 +4191,9 @@
           <a:lstStyle/>
           <a:p>
             <a:r>
-              <a:rPr lang="en-US" dirty="0" smtClean="0"/>
+              <a:rPr lang="en-US" dirty="0"/>
               <a:t>Exploratory Factor Analysis (EFA)</a:t>
             </a:r>
-            <a:endParaRPr lang="en-US" dirty="0"/>
           </a:p>
         </p:txBody>
       </p:sp>
@@ -4236,14 +4215,14 @@
           <a:lstStyle/>
           <a:p>
             <a:r>
-              <a:rPr lang="en-US" dirty="0" smtClean="0"/>
+              <a:rPr lang="en-US" dirty="0"/>
               <a:t>Exploratory Factor Analysis (EFA) will use inter-correlations among the items to give us a sense of</a:t>
             </a:r>
             <a:r>
-              <a:rPr lang="mr-IN" dirty="0" smtClean="0"/>
+              <a:rPr lang="mr-IN" dirty="0"/>
               <a:t>…</a:t>
             </a:r>
-            <a:endParaRPr lang="en-US" dirty="0" smtClean="0"/>
+            <a:endParaRPr lang="en-US" dirty="0"/>
           </a:p>
           <a:p>
             <a:pPr marL="731520" lvl="1" indent="-457200">
@@ -4251,18 +4230,9 @@
               <a:buAutoNum type="arabicPeriod"/>
             </a:pPr>
             <a:r>
-              <a:rPr lang="en-US" dirty="0" smtClean="0"/>
-              <a:t>how </a:t>
-            </a:r>
-            <a:r>
-              <a:rPr lang="en-US" dirty="0"/>
-              <a:t>many </a:t>
-            </a:r>
-            <a:r>
-              <a:rPr lang="en-US" dirty="0" smtClean="0"/>
-              <a:t>factors may be present, </a:t>
-            </a:r>
-            <a:endParaRPr lang="en-US" dirty="0"/>
+              <a:rPr lang="en-US" dirty="0"/>
+              <a:t>how many factors may be present, </a:t>
+            </a:r>
           </a:p>
           <a:p>
             <a:pPr marL="731520" lvl="1" indent="-457200">
@@ -4270,16 +4240,8 @@
               <a:buAutoNum type="arabicPeriod"/>
             </a:pPr>
             <a:r>
-              <a:rPr lang="en-US" dirty="0" smtClean="0"/>
-              <a:t>which </a:t>
-            </a:r>
-            <a:r>
-              <a:rPr lang="en-US" dirty="0"/>
-              <a:t>items can be explained by which </a:t>
-            </a:r>
-            <a:r>
-              <a:rPr lang="en-US" dirty="0" smtClean="0"/>
-              <a:t>factors, and</a:t>
+              <a:rPr lang="en-US" dirty="0"/>
+              <a:t>which items can be explained by which factors, and</a:t>
             </a:r>
           </a:p>
           <a:p>
@@ -4288,7 +4250,7 @@
               <a:buAutoNum type="arabicPeriod"/>
             </a:pPr>
             <a:r>
-              <a:rPr lang="en-US" dirty="0" smtClean="0"/>
+              <a:rPr lang="en-US" dirty="0"/>
               <a:t>the extent to which these underlying factors are correlated with each other.</a:t>
             </a:r>
           </a:p>
@@ -4297,27 +4259,22 @@
           </a:p>
           <a:p>
             <a:r>
-              <a:rPr lang="en-US" dirty="0" smtClean="0"/>
+              <a:rPr lang="en-US" dirty="0"/>
               <a:t>EFA is just that, exploratory. </a:t>
             </a:r>
-            <a:endParaRPr lang="en-US" dirty="0"/>
           </a:p>
           <a:p>
             <a:pPr lvl="1"/>
             <a:r>
-              <a:rPr lang="en-US" dirty="0" smtClean="0"/>
+              <a:rPr lang="en-US" dirty="0"/>
               <a:t>It is important to keep in mind that in the end this is a data driven technique. Meaning that peculiarities in the data may lead you to a rather weird solution.</a:t>
             </a:r>
           </a:p>
           <a:p>
             <a:pPr lvl="1"/>
             <a:r>
-              <a:rPr lang="en-US" dirty="0" smtClean="0"/>
-              <a:t>It takes some sense finesse, listen to what your data is telling you</a:t>
-            </a:r>
-            <a:r>
-              <a:rPr lang="en-US" dirty="0"/>
-              <a:t>.</a:t>
+              <a:rPr lang="en-US" dirty="0"/>
+              <a:t>It takes some sense finesse, listen to what your data is telling you.</a:t>
             </a:r>
           </a:p>
         </p:txBody>
@@ -4368,10 +4325,9 @@
           <a:lstStyle/>
           <a:p>
             <a:r>
-              <a:rPr lang="en-US" dirty="0" smtClean="0"/>
+              <a:rPr lang="en-US" dirty="0"/>
               <a:t>Factor Rotation</a:t>
             </a:r>
-            <a:endParaRPr lang="en-US" dirty="0"/>
           </a:p>
         </p:txBody>
       </p:sp>
@@ -4393,11 +4349,11 @@
           <a:lstStyle/>
           <a:p>
             <a:r>
-              <a:rPr lang="en-US" dirty="0" err="1" smtClean="0"/>
+              <a:rPr lang="en-US" dirty="0" err="1"/>
               <a:t>Unrotated</a:t>
             </a:r>
             <a:r>
-              <a:rPr lang="en-US" dirty="0" smtClean="0"/>
+              <a:rPr lang="en-US" dirty="0"/>
               <a:t> solution</a:t>
             </a:r>
           </a:p>
@@ -4509,10 +4465,9 @@
           <a:lstStyle/>
           <a:p>
             <a:r>
-              <a:rPr lang="en-US" dirty="0" smtClean="0"/>
+              <a:rPr lang="en-US" dirty="0"/>
               <a:t>Factor Rotation</a:t>
             </a:r>
-            <a:endParaRPr lang="en-US" dirty="0"/>
           </a:p>
         </p:txBody>
       </p:sp>
@@ -4534,11 +4489,11 @@
           <a:lstStyle/>
           <a:p>
             <a:r>
-              <a:rPr lang="en-US" dirty="0" err="1" smtClean="0"/>
+              <a:rPr lang="en-US" dirty="0" err="1"/>
               <a:t>Unrotated</a:t>
             </a:r>
             <a:r>
-              <a:rPr lang="en-US" dirty="0" smtClean="0"/>
+              <a:rPr lang="en-US" dirty="0"/>
               <a:t> solution</a:t>
             </a:r>
           </a:p>
@@ -4722,10 +4677,9 @@
           <a:lstStyle/>
           <a:p>
             <a:r>
-              <a:rPr lang="en-US" dirty="0" smtClean="0"/>
+              <a:rPr lang="en-US" dirty="0"/>
               <a:t>Factor Rotation</a:t>
             </a:r>
-            <a:endParaRPr lang="en-US" dirty="0"/>
           </a:p>
         </p:txBody>
       </p:sp>
@@ -4747,7 +4701,7 @@
           <a:lstStyle/>
           <a:p>
             <a:r>
-              <a:rPr lang="en-US" dirty="0" smtClean="0"/>
+              <a:rPr lang="en-US" dirty="0"/>
               <a:t>Orthogonal rotation</a:t>
             </a:r>
           </a:p>
@@ -4859,10 +4813,9 @@
           <a:lstStyle/>
           <a:p>
             <a:r>
-              <a:rPr lang="en-US" dirty="0" smtClean="0"/>
+              <a:rPr lang="en-US" dirty="0"/>
               <a:t>Factor Rotation</a:t>
             </a:r>
-            <a:endParaRPr lang="en-US" dirty="0"/>
           </a:p>
         </p:txBody>
       </p:sp>
@@ -4884,7 +4837,7 @@
           <a:lstStyle/>
           <a:p>
             <a:r>
-              <a:rPr lang="en-US" dirty="0" smtClean="0"/>
+              <a:rPr lang="en-US" dirty="0"/>
               <a:t>Orthogonal rotation</a:t>
             </a:r>
           </a:p>
@@ -5068,10 +5021,9 @@
           <a:lstStyle/>
           <a:p>
             <a:r>
-              <a:rPr lang="en-US" dirty="0" smtClean="0"/>
+              <a:rPr lang="en-US" dirty="0"/>
               <a:t>Exploratory Factor Analysis (EFA)</a:t>
             </a:r>
-            <a:endParaRPr lang="en-US" dirty="0"/>
           </a:p>
         </p:txBody>
       </p:sp>
@@ -5093,10 +5045,9 @@
           <a:lstStyle/>
           <a:p>
             <a:r>
-              <a:rPr lang="en-US" dirty="0" smtClean="0"/>
+              <a:rPr lang="en-US" dirty="0"/>
               <a:t>Oblique factor rotation</a:t>
             </a:r>
-            <a:endParaRPr lang="en-US" dirty="0"/>
           </a:p>
         </p:txBody>
       </p:sp>
@@ -5236,10 +5187,9 @@
           <a:lstStyle/>
           <a:p>
             <a:r>
-              <a:rPr lang="en-US" dirty="0" smtClean="0"/>
+              <a:rPr lang="en-US" dirty="0"/>
               <a:t>Exploratory Factor Analysis (EFA)</a:t>
             </a:r>
-            <a:endParaRPr lang="en-US" dirty="0"/>
           </a:p>
         </p:txBody>
       </p:sp>
@@ -5261,7 +5211,7 @@
           <a:lstStyle/>
           <a:p>
             <a:r>
-              <a:rPr lang="en-US" dirty="0" smtClean="0"/>
+              <a:rPr lang="en-US" dirty="0"/>
               <a:t>We will use the psych package</a:t>
             </a:r>
           </a:p>
@@ -5295,8 +5245,20 @@
                 <a:tableStyleId>{5C22544A-7EE6-4342-B048-85BDC9FD1C3A}</a:tableStyleId>
               </a:tblPr>
               <a:tblGrid>
-                <a:gridCol w="4419894"/>
-                <a:gridCol w="3622040"/>
+                <a:gridCol w="4419894">
+                  <a:extLst>
+                    <a:ext uri="{9D8B030D-6E8A-4147-A177-3AD203B41FA5}">
+                      <a16:colId xmlns:a16="http://schemas.microsoft.com/office/drawing/2014/main" val="20000"/>
+                    </a:ext>
+                  </a:extLst>
+                </a:gridCol>
+                <a:gridCol w="3622040">
+                  <a:extLst>
+                    <a:ext uri="{9D8B030D-6E8A-4147-A177-3AD203B41FA5}">
+                      <a16:colId xmlns:a16="http://schemas.microsoft.com/office/drawing/2014/main" val="20001"/>
+                    </a:ext>
+                  </a:extLst>
+                </a:gridCol>
               </a:tblGrid>
               <a:tr h="589280">
                 <a:tc>
@@ -5306,18 +5268,13 @@
                     <a:p>
                       <a:pPr algn="ctr"/>
                       <a:r>
-                        <a:rPr lang="en-US" sz="2800" dirty="0" smtClean="0">
+                        <a:rPr lang="en-US" sz="2800" dirty="0">
                           <a:solidFill>
                             <a:schemeClr val="bg1"/>
                           </a:solidFill>
                         </a:rPr>
                         <a:t>Inference Test</a:t>
                       </a:r>
-                      <a:endParaRPr lang="en-US" sz="2800" dirty="0">
-                        <a:solidFill>
-                          <a:schemeClr val="bg1"/>
-                        </a:solidFill>
-                      </a:endParaRPr>
                     </a:p>
                   </a:txBody>
                   <a:tcPr anchor="b">
@@ -5357,18 +5314,13 @@
                     <a:p>
                       <a:pPr algn="ctr"/>
                       <a:r>
-                        <a:rPr lang="en-US" sz="2800" dirty="0" smtClean="0">
+                        <a:rPr lang="en-US" sz="2800" dirty="0">
                           <a:solidFill>
                             <a:schemeClr val="bg1"/>
                           </a:solidFill>
                         </a:rPr>
                         <a:t>R function</a:t>
                       </a:r>
-                      <a:endParaRPr lang="en-US" sz="2800" dirty="0">
-                        <a:solidFill>
-                          <a:schemeClr val="bg1"/>
-                        </a:solidFill>
-                      </a:endParaRPr>
                     </a:p>
                   </a:txBody>
                   <a:tcPr anchor="b">
@@ -5401,6 +5353,11 @@
                     </a:solidFill>
                   </a:tcPr>
                 </a:tc>
+                <a:extLst>
+                  <a:ext uri="{0D108BD9-81ED-4DB2-BD59-A6C34878D82A}">
+                    <a16:rowId xmlns:a16="http://schemas.microsoft.com/office/drawing/2014/main" val="10000"/>
+                  </a:ext>
+                </a:extLst>
               </a:tr>
               <a:tr h="596616">
                 <a:tc>
@@ -5410,7 +5367,7 @@
                     <a:p>
                       <a:pPr algn="ctr"/>
                       <a:r>
-                        <a:rPr lang="en-US" sz="2400" dirty="0" smtClean="0"/>
+                        <a:rPr lang="en-US" sz="2400" dirty="0"/>
                         <a:t>Factor Analysis</a:t>
                       </a:r>
                       <a:endParaRPr lang="en-US" sz="2000" dirty="0"/>
@@ -5450,10 +5407,9 @@
                     <a:p>
                       <a:pPr algn="ctr"/>
                       <a:r>
-                        <a:rPr lang="en-US" sz="2400" dirty="0" smtClean="0"/>
+                        <a:rPr lang="en-US" sz="2400" dirty="0"/>
                         <a:t>fa()</a:t>
                       </a:r>
-                      <a:endParaRPr lang="en-US" sz="2400" dirty="0"/>
                     </a:p>
                   </a:txBody>
                   <a:tcPr anchor="ctr">
@@ -5483,6 +5439,11 @@
                     </a:lnBlToTr>
                   </a:tcPr>
                 </a:tc>
+                <a:extLst>
+                  <a:ext uri="{0D108BD9-81ED-4DB2-BD59-A6C34878D82A}">
+                    <a16:rowId xmlns:a16="http://schemas.microsoft.com/office/drawing/2014/main" val="10001"/>
+                  </a:ext>
+                </a:extLst>
               </a:tr>
               <a:tr h="596616">
                 <a:tc>
@@ -5492,10 +5453,9 @@
                     <a:p>
                       <a:pPr algn="ctr"/>
                       <a:r>
-                        <a:rPr lang="en-US" sz="2400" dirty="0" smtClean="0"/>
+                        <a:rPr lang="en-US" sz="2400" dirty="0"/>
                         <a:t>Principal Component Analysis</a:t>
                       </a:r>
-                      <a:endParaRPr lang="en-US" sz="2400" dirty="0"/>
                     </a:p>
                   </a:txBody>
                   <a:tcPr anchor="ctr">
@@ -5532,10 +5492,9 @@
                     <a:p>
                       <a:pPr algn="ctr"/>
                       <a:r>
-                        <a:rPr lang="en-US" sz="2400" dirty="0" smtClean="0"/>
+                        <a:rPr lang="en-US" sz="2400" dirty="0"/>
                         <a:t>principal()</a:t>
                       </a:r>
-                      <a:endParaRPr lang="en-US" sz="2400" dirty="0"/>
                     </a:p>
                   </a:txBody>
                   <a:tcPr anchor="ctr">
@@ -5565,6 +5524,11 @@
                     </a:lnBlToTr>
                   </a:tcPr>
                 </a:tc>
+                <a:extLst>
+                  <a:ext uri="{0D108BD9-81ED-4DB2-BD59-A6C34878D82A}">
+                    <a16:rowId xmlns:a16="http://schemas.microsoft.com/office/drawing/2014/main" val="10002"/>
+                  </a:ext>
+                </a:extLst>
               </a:tr>
             </a:tbl>
           </a:graphicData>
@@ -5624,10 +5588,9 @@
               </a:spcBef>
             </a:pPr>
             <a:r>
-              <a:rPr lang="en-US" dirty="0" smtClean="0"/>
+              <a:rPr lang="en-US" dirty="0"/>
               <a:t>R Markdown file</a:t>
             </a:r>
-            <a:endParaRPr lang="en-US" dirty="0"/>
           </a:p>
         </p:txBody>
       </p:sp>
@@ -5696,10 +5659,9 @@
           <a:lstStyle/>
           <a:p>
             <a:r>
-              <a:rPr lang="en-US" dirty="0" smtClean="0"/>
+              <a:rPr lang="en-US" dirty="0"/>
               <a:t>Confirmatory Factor Analysis (CFA)</a:t>
             </a:r>
-            <a:endParaRPr lang="en-US" dirty="0"/>
           </a:p>
         </p:txBody>
       </p:sp>
@@ -5725,41 +5687,36 @@
             </a:pPr>
             <a:r>
               <a:rPr lang="en-US" b="1" dirty="0"/>
-              <a:t>d</a:t>
-            </a:r>
-            <a:r>
-              <a:rPr lang="en-US" b="1" dirty="0" smtClean="0"/>
-              <a:t>ata(HolzingerSwineford1939)</a:t>
+              <a:t>data(HolzingerSwineford1939)</a:t>
             </a:r>
           </a:p>
           <a:p>
             <a:pPr marL="45720" indent="0" algn="ctr">
               <a:buNone/>
             </a:pPr>
-            <a:endParaRPr lang="en-US" b="1" dirty="0" smtClean="0"/>
-          </a:p>
-          <a:p>
-            <a:r>
-              <a:rPr lang="en-US" dirty="0" smtClean="0"/>
+            <a:endParaRPr lang="en-US" b="1" dirty="0"/>
+          </a:p>
+          <a:p>
+            <a:r>
+              <a:rPr lang="en-US" dirty="0"/>
               <a:t>Mental ability test score from 7</a:t>
             </a:r>
             <a:r>
-              <a:rPr lang="en-US" baseline="30000" dirty="0" smtClean="0"/>
+              <a:rPr lang="en-US" baseline="30000" dirty="0"/>
               <a:t>th</a:t>
             </a:r>
             <a:r>
-              <a:rPr lang="en-US" dirty="0" smtClean="0"/>
+              <a:rPr lang="en-US" dirty="0"/>
               <a:t> and 8</a:t>
             </a:r>
             <a:r>
-              <a:rPr lang="en-US" baseline="30000" dirty="0" smtClean="0"/>
+              <a:rPr lang="en-US" baseline="30000" dirty="0"/>
               <a:t>th</a:t>
             </a:r>
             <a:r>
-              <a:rPr lang="en-US" dirty="0" smtClean="0"/>
+              <a:rPr lang="en-US" dirty="0"/>
               <a:t> grade children from two schools</a:t>
             </a:r>
-            <a:endParaRPr lang="en-US" dirty="0"/>
           </a:p>
           <a:p>
             <a:pPr lvl="1" fontAlgn="base"/>
@@ -5803,11 +5760,7 @@
             </a:r>
             <a:r>
               <a:rPr lang="en-US" dirty="0"/>
-              <a:t> factor measured by 3 variables: x7, x8 and </a:t>
-            </a:r>
-            <a:r>
-              <a:rPr lang="en-US" dirty="0" smtClean="0"/>
-              <a:t>x9</a:t>
+              <a:t> factor measured by 3 variables: x7, x8 and x9</a:t>
             </a:r>
           </a:p>
           <a:p>
@@ -5816,22 +5769,21 @@
           </a:p>
           <a:p>
             <a:r>
-              <a:rPr lang="en-US" dirty="0" smtClean="0"/>
+              <a:rPr lang="en-US" dirty="0"/>
               <a:t>We want to test if indeed these measures fall on these three scales as we hypothesize.</a:t>
             </a:r>
-            <a:endParaRPr lang="en-US" dirty="0"/>
-          </a:p>
-          <a:p>
-            <a:r>
-              <a:rPr lang="en-US" dirty="0" smtClean="0"/>
+          </a:p>
+          <a:p>
+            <a:r>
+              <a:rPr lang="en-US" dirty="0"/>
               <a:t>We are </a:t>
             </a:r>
             <a:r>
-              <a:rPr lang="en-US" i="1" dirty="0" smtClean="0"/>
+              <a:rPr lang="en-US" i="1" dirty="0"/>
               <a:t>confirming</a:t>
             </a:r>
             <a:r>
-              <a:rPr lang="en-US" dirty="0" smtClean="0"/>
+              <a:rPr lang="en-US" dirty="0"/>
               <a:t> a hypothesized factor structure instead of exploring.</a:t>
             </a:r>
           </a:p>
@@ -5847,13 +5799,6 @@
   <p:clrMapOvr>
     <a:masterClrMapping/>
   </p:clrMapOvr>
-  <p:timing>
-    <p:tnLst>
-      <p:par>
-        <p:cTn id="1" dur="indefinite" restart="never" nodeType="tmRoot"/>
-      </p:par>
-    </p:tnLst>
-  </p:timing>
 </p:sld>
 </file>
 
@@ -5927,60 +5872,12 @@
           <a:p>
             <a:pPr fontAlgn="base"/>
             <a:r>
-              <a:rPr lang="en-US" sz="3200" dirty="0" smtClean="0">
-                <a:solidFill>
-                  <a:schemeClr val="accent1"/>
-                </a:solidFill>
-              </a:rPr>
-              <a:t>Visual</a:t>
-            </a:r>
-            <a:r>
               <a:rPr lang="en-US" sz="3200" dirty="0">
                 <a:solidFill>
                   <a:schemeClr val="accent1"/>
                 </a:solidFill>
               </a:rPr>
-              <a:t> </a:t>
-            </a:r>
-            <a:r>
-              <a:rPr lang="en-US" sz="3200" dirty="0" smtClean="0">
-                <a:solidFill>
-                  <a:schemeClr val="accent1"/>
-                </a:solidFill>
-              </a:rPr>
-              <a:t>factor:</a:t>
-            </a:r>
-            <a:r>
-              <a:rPr lang="en-US" sz="3200" dirty="0">
-                <a:solidFill>
-                  <a:schemeClr val="accent1"/>
-                </a:solidFill>
-              </a:rPr>
-              <a:t> 	</a:t>
-            </a:r>
-            <a:r>
-              <a:rPr lang="en-US" sz="3200" dirty="0" smtClean="0">
-                <a:solidFill>
-                  <a:schemeClr val="accent1"/>
-                </a:solidFill>
-              </a:rPr>
-              <a:t>x1</a:t>
-            </a:r>
-            <a:r>
-              <a:rPr lang="en-US" sz="3200" dirty="0">
-                <a:solidFill>
-                  <a:schemeClr val="accent1"/>
-                </a:solidFill>
-              </a:rPr>
-              <a:t>, x2 and </a:t>
-            </a:r>
-            <a:r>
-              <a:rPr lang="en-US" sz="3200" dirty="0" smtClean="0">
-                <a:solidFill>
-                  <a:schemeClr val="accent1"/>
-                </a:solidFill>
-              </a:rPr>
-              <a:t>x3</a:t>
+              <a:t>Visual factor: 	x1, x2 and x3</a:t>
             </a:r>
           </a:p>
           <a:p>
@@ -5994,119 +5891,31 @@
           <a:p>
             <a:pPr fontAlgn="base"/>
             <a:r>
-              <a:rPr lang="en-US" sz="3200" dirty="0" smtClean="0">
-                <a:solidFill>
-                  <a:schemeClr val="accent1"/>
-                </a:solidFill>
-              </a:rPr>
-              <a:t>Textual</a:t>
-            </a:r>
-            <a:r>
               <a:rPr lang="en-US" sz="3200" dirty="0">
                 <a:solidFill>
                   <a:schemeClr val="accent1"/>
                 </a:solidFill>
               </a:rPr>
-              <a:t> </a:t>
-            </a:r>
-            <a:r>
-              <a:rPr lang="en-US" sz="3200" dirty="0" smtClean="0">
-                <a:solidFill>
-                  <a:schemeClr val="accent1"/>
-                </a:solidFill>
-              </a:rPr>
-              <a:t>factor:</a:t>
-            </a:r>
+              <a:t>Textual factor: 	x4, x5 and x6</a:t>
+            </a:r>
+          </a:p>
+          <a:p>
+            <a:pPr fontAlgn="base"/>
+            <a:endParaRPr lang="en-US" sz="3200" dirty="0">
+              <a:solidFill>
+                <a:schemeClr val="accent1"/>
+              </a:solidFill>
+            </a:endParaRPr>
+          </a:p>
+          <a:p>
+            <a:pPr fontAlgn="base"/>
             <a:r>
               <a:rPr lang="en-US" sz="3200" dirty="0">
                 <a:solidFill>
                   <a:schemeClr val="accent1"/>
                 </a:solidFill>
               </a:rPr>
-              <a:t> 	</a:t>
-            </a:r>
-            <a:r>
-              <a:rPr lang="en-US" sz="3200" dirty="0" smtClean="0">
-                <a:solidFill>
-                  <a:schemeClr val="accent1"/>
-                </a:solidFill>
-              </a:rPr>
-              <a:t>x4</a:t>
-            </a:r>
-            <a:r>
-              <a:rPr lang="en-US" sz="3200" dirty="0">
-                <a:solidFill>
-                  <a:schemeClr val="accent1"/>
-                </a:solidFill>
-              </a:rPr>
-              <a:t>, x5 and </a:t>
-            </a:r>
-            <a:r>
-              <a:rPr lang="en-US" sz="3200" dirty="0" smtClean="0">
-                <a:solidFill>
-                  <a:schemeClr val="accent1"/>
-                </a:solidFill>
-              </a:rPr>
-              <a:t>x6</a:t>
-            </a:r>
-          </a:p>
-          <a:p>
-            <a:pPr fontAlgn="base"/>
-            <a:endParaRPr lang="en-US" sz="3200" dirty="0" smtClean="0">
-              <a:solidFill>
-                <a:schemeClr val="accent1"/>
-              </a:solidFill>
-            </a:endParaRPr>
-          </a:p>
-          <a:p>
-            <a:pPr fontAlgn="base"/>
-            <a:r>
-              <a:rPr lang="en-US" sz="3200" dirty="0" smtClean="0">
-                <a:solidFill>
-                  <a:schemeClr val="accent1"/>
-                </a:solidFill>
-              </a:rPr>
-              <a:t>Speed</a:t>
-            </a:r>
-            <a:r>
-              <a:rPr lang="en-US" sz="3200" dirty="0">
-                <a:solidFill>
-                  <a:schemeClr val="accent1"/>
-                </a:solidFill>
-              </a:rPr>
-              <a:t> </a:t>
-            </a:r>
-            <a:r>
-              <a:rPr lang="en-US" sz="3200" dirty="0" smtClean="0">
-                <a:solidFill>
-                  <a:schemeClr val="accent1"/>
-                </a:solidFill>
-              </a:rPr>
-              <a:t>factor:</a:t>
-            </a:r>
-            <a:r>
-              <a:rPr lang="en-US" sz="3200" dirty="0">
-                <a:solidFill>
-                  <a:schemeClr val="accent1"/>
-                </a:solidFill>
-              </a:rPr>
-              <a:t> 	</a:t>
-            </a:r>
-            <a:r>
-              <a:rPr lang="en-US" sz="3200" dirty="0" smtClean="0">
-                <a:solidFill>
-                  <a:schemeClr val="accent1"/>
-                </a:solidFill>
-              </a:rPr>
-              <a:t>x7</a:t>
-            </a:r>
-            <a:r>
-              <a:rPr lang="en-US" sz="3200" dirty="0">
-                <a:solidFill>
-                  <a:schemeClr val="accent1"/>
-                </a:solidFill>
-              </a:rPr>
-              <a:t>, x8 and x9</a:t>
+              <a:t>Speed factor: 	x7, x8 and x9</a:t>
             </a:r>
           </a:p>
         </p:txBody>
@@ -6121,13 +5930,6 @@
   <p:clrMapOvr>
     <a:masterClrMapping/>
   </p:clrMapOvr>
-  <p:timing>
-    <p:tnLst>
-      <p:par>
-        <p:cTn id="1" dur="indefinite" restart="never" nodeType="tmRoot"/>
-      </p:par>
-    </p:tnLst>
-  </p:timing>
 </p:sld>
 </file>
 
@@ -6164,10 +5966,9 @@
           <a:lstStyle/>
           <a:p>
             <a:r>
-              <a:rPr lang="en-US" dirty="0" smtClean="0"/>
+              <a:rPr lang="en-US" dirty="0"/>
               <a:t>Day 2</a:t>
             </a:r>
-            <a:endParaRPr lang="en-US" dirty="0"/>
           </a:p>
         </p:txBody>
       </p:sp>
@@ -6199,7 +6000,7 @@
               <a:buChar char="•"/>
             </a:pPr>
             <a:r>
-              <a:rPr lang="en-US" dirty="0" smtClean="0"/>
+              <a:rPr lang="en-US" dirty="0"/>
               <a:t>ANOVA and regression</a:t>
             </a:r>
           </a:p>
@@ -6215,7 +6016,7 @@
               <a:buChar char="•"/>
             </a:pPr>
             <a:r>
-              <a:rPr lang="en-US" dirty="0" smtClean="0"/>
+              <a:rPr lang="en-US" dirty="0"/>
               <a:t>Preparing APA style manuscripts</a:t>
             </a:r>
           </a:p>
@@ -6231,7 +6032,7 @@
               <a:buChar char="•"/>
             </a:pPr>
             <a:r>
-              <a:rPr lang="en-US" dirty="0" smtClean="0"/>
+              <a:rPr lang="en-US" dirty="0"/>
               <a:t>Exploratory Factor Analysis (EFA) and Confirmatory Factor Analysis (CFA)</a:t>
             </a:r>
           </a:p>
@@ -6247,7 +6048,7 @@
               <a:buChar char="•"/>
             </a:pPr>
             <a:r>
-              <a:rPr lang="en-US" dirty="0" smtClean="0"/>
+              <a:rPr lang="en-US" dirty="0"/>
               <a:t>Path Analysis and SEM</a:t>
             </a:r>
           </a:p>
@@ -6263,13 +6064,6 @@
   <p:clrMapOvr>
     <a:masterClrMapping/>
   </p:clrMapOvr>
-  <p:timing>
-    <p:tnLst>
-      <p:par>
-        <p:cTn id="1" dur="indefinite" restart="never" nodeType="tmRoot"/>
-      </p:par>
-    </p:tnLst>
-  </p:timing>
 </p:sld>
 </file>
 
@@ -6336,10 +6130,9 @@
           <a:lstStyle/>
           <a:p>
             <a:r>
-              <a:rPr lang="en-US" dirty="0" smtClean="0"/>
+              <a:rPr lang="en-US" dirty="0"/>
               <a:t>Confirmatory Factor Analysis (CFA)</a:t>
             </a:r>
-            <a:endParaRPr lang="en-US" dirty="0"/>
           </a:p>
         </p:txBody>
       </p:sp>
@@ -6361,27 +6154,19 @@
           <a:lstStyle/>
           <a:p>
             <a:r>
-              <a:rPr lang="en-US" dirty="0" smtClean="0"/>
+              <a:rPr lang="en-US" dirty="0"/>
               <a:t>Does the model we have in our heads actually fit the data?</a:t>
             </a:r>
           </a:p>
           <a:p>
             <a:pPr lvl="1"/>
             <a:r>
-              <a:rPr lang="en-US" dirty="0" smtClean="0"/>
-              <a:t>Assessed with </a:t>
-            </a:r>
-            <a:r>
-              <a:rPr lang="en-US" dirty="0"/>
-              <a:t>f</a:t>
-            </a:r>
-            <a:r>
-              <a:rPr lang="en-US" dirty="0" smtClean="0"/>
-              <a:t>it statistics</a:t>
-            </a:r>
-          </a:p>
-          <a:p>
-            <a:endParaRPr lang="en-US" dirty="0" smtClean="0"/>
+              <a:rPr lang="en-US" dirty="0"/>
+              <a:t>Assessed with fit statistics</a:t>
+            </a:r>
+          </a:p>
+          <a:p>
+            <a:endParaRPr lang="en-US" dirty="0"/>
           </a:p>
         </p:txBody>
       </p:sp>
@@ -6408,7 +6193,7 @@
           <a:lstStyle/>
           <a:p>
             <a:r>
-              <a:rPr lang="en-US" b="1" dirty="0" smtClean="0">
+              <a:rPr lang="en-US" b="1" dirty="0">
                 <a:solidFill>
                   <a:schemeClr val="accent2"/>
                 </a:solidFill>
@@ -6416,7 +6201,7 @@
               <a:t>Data </a:t>
             </a:r>
             <a:r>
-              <a:rPr lang="en-US" b="1" dirty="0" err="1" smtClean="0">
+              <a:rPr lang="en-US" b="1" dirty="0" err="1">
                 <a:solidFill>
                   <a:schemeClr val="accent2"/>
                 </a:solidFill>
@@ -6424,18 +6209,13 @@
               <a:t>cor</a:t>
             </a:r>
             <a:r>
-              <a:rPr lang="en-US" b="1" dirty="0" smtClean="0">
+              <a:rPr lang="en-US" b="1" dirty="0">
                 <a:solidFill>
                   <a:schemeClr val="accent2"/>
                 </a:solidFill>
               </a:rPr>
               <a:t> matrix</a:t>
             </a:r>
-            <a:endParaRPr lang="en-US" b="1" dirty="0">
-              <a:solidFill>
-                <a:schemeClr val="accent2"/>
-              </a:solidFill>
-            </a:endParaRPr>
           </a:p>
         </p:txBody>
       </p:sp>
@@ -6462,7 +6242,7 @@
           <a:lstStyle/>
           <a:p>
             <a:r>
-              <a:rPr lang="en-US" b="1" smtClean="0">
+              <a:rPr lang="en-US" b="1">
                 <a:solidFill>
                   <a:schemeClr val="accent2"/>
                 </a:solidFill>
@@ -6560,7 +6340,7 @@
           <a:lstStyle/>
           <a:p>
             <a:r>
-              <a:rPr lang="en-US" b="1" dirty="0" smtClean="0">
+              <a:rPr lang="en-US" b="1" dirty="0">
                 <a:solidFill>
                   <a:schemeClr val="accent2"/>
                 </a:solidFill>
@@ -6568,7 +6348,7 @@
               <a:t>Model implied </a:t>
             </a:r>
             <a:r>
-              <a:rPr lang="en-US" b="1" dirty="0" err="1" smtClean="0">
+              <a:rPr lang="en-US" b="1" dirty="0" err="1">
                 <a:solidFill>
                   <a:schemeClr val="accent2"/>
                 </a:solidFill>
@@ -6576,18 +6356,13 @@
               <a:t>cor</a:t>
             </a:r>
             <a:r>
-              <a:rPr lang="en-US" b="1" dirty="0" smtClean="0">
+              <a:rPr lang="en-US" b="1" dirty="0">
                 <a:solidFill>
                   <a:schemeClr val="accent2"/>
                 </a:solidFill>
               </a:rPr>
               <a:t> matrix</a:t>
             </a:r>
-            <a:endParaRPr lang="en-US" b="1" dirty="0">
-              <a:solidFill>
-                <a:schemeClr val="accent2"/>
-              </a:solidFill>
-            </a:endParaRPr>
           </a:p>
         </p:txBody>
       </p:sp>
@@ -6655,7 +6430,7 @@
           <a:lstStyle/>
           <a:p>
             <a:r>
-              <a:rPr lang="en-US" b="1" smtClean="0">
+              <a:rPr lang="en-US" b="1">
                 <a:solidFill>
                   <a:schemeClr val="accent2"/>
                 </a:solidFill>
@@ -6680,13 +6455,6 @@
   <p:clrMapOvr>
     <a:masterClrMapping/>
   </p:clrMapOvr>
-  <p:timing>
-    <p:tnLst>
-      <p:par>
-        <p:cTn id="1" dur="indefinite" restart="never" nodeType="tmRoot"/>
-      </p:par>
-    </p:tnLst>
-  </p:timing>
 </p:sld>
 </file>
 
@@ -6723,10 +6491,9 @@
           <a:lstStyle/>
           <a:p>
             <a:r>
-              <a:rPr lang="en-US" dirty="0" smtClean="0"/>
+              <a:rPr lang="en-US" dirty="0"/>
               <a:t>Confirmatory Factor Analysis (CFA)</a:t>
             </a:r>
-            <a:endParaRPr lang="en-US" dirty="0"/>
           </a:p>
         </p:txBody>
       </p:sp>
@@ -6748,30 +6515,30 @@
           <a:lstStyle/>
           <a:p>
             <a:r>
-              <a:rPr lang="en-US" dirty="0" smtClean="0"/>
+              <a:rPr lang="en-US" dirty="0"/>
               <a:t>We will use the R package </a:t>
             </a:r>
             <a:r>
-              <a:rPr lang="en-US" dirty="0" err="1" smtClean="0"/>
+              <a:rPr lang="en-US" dirty="0" err="1"/>
               <a:t>lavaan</a:t>
             </a:r>
             <a:r>
-              <a:rPr lang="en-US" dirty="0" smtClean="0"/>
+              <a:rPr lang="en-US" dirty="0"/>
               <a:t> to fit CFAs</a:t>
             </a:r>
           </a:p>
           <a:p>
             <a:pPr lvl="1"/>
             <a:r>
-              <a:rPr lang="en-US" dirty="0" smtClean="0"/>
+              <a:rPr lang="en-US" dirty="0"/>
               <a:t>most widely used </a:t>
             </a:r>
             <a:r>
-              <a:rPr lang="en-US" b="1" dirty="0" smtClean="0"/>
+              <a:rPr lang="en-US" b="1" dirty="0"/>
               <a:t>Structural Equation Modeling (SEM) </a:t>
             </a:r>
             <a:r>
-              <a:rPr lang="en-US" dirty="0" smtClean="0"/>
+              <a:rPr lang="en-US" dirty="0"/>
               <a:t>package in R.</a:t>
             </a:r>
           </a:p>
@@ -6781,67 +6548,37 @@
           </a:p>
           <a:p>
             <a:r>
-              <a:rPr lang="en-US" b="1" dirty="0" smtClean="0"/>
-              <a:t>Step </a:t>
-            </a:r>
-            <a:r>
               <a:rPr lang="en-US" b="1" dirty="0"/>
-              <a:t>1: </a:t>
-            </a:r>
-            <a:r>
-              <a:rPr lang="en-US" dirty="0"/>
-              <a:t>Specify the </a:t>
-            </a:r>
-            <a:r>
-              <a:rPr lang="en-US" dirty="0" smtClean="0"/>
-              <a:t>model</a:t>
-            </a:r>
+              <a:t>Step 1: </a:t>
+            </a:r>
+            <a:r>
+              <a:rPr lang="en-US" dirty="0"/>
+              <a:t>Specify the model</a:t>
+            </a:r>
+          </a:p>
+          <a:p>
+            <a:r>
+              <a:rPr lang="en-US" b="1" dirty="0"/>
+              <a:t>Step 2:</a:t>
+            </a:r>
+            <a:r>
+              <a:rPr lang="en-US" dirty="0"/>
+              <a:t> Fit the model</a:t>
+            </a:r>
+          </a:p>
+          <a:p>
+            <a:r>
+              <a:rPr lang="en-US" b="1" dirty="0"/>
+              <a:t>Step 3: </a:t>
+            </a:r>
+            <a:r>
+              <a:rPr lang="en-US" dirty="0"/>
+              <a:t>Ask for the output you want</a:t>
+            </a:r>
+          </a:p>
+          <a:p>
+            <a:pPr lvl="1"/>
             <a:endParaRPr lang="en-US" dirty="0"/>
-          </a:p>
-          <a:p>
-            <a:r>
-              <a:rPr lang="en-US" b="1" dirty="0" smtClean="0"/>
-              <a:t>Step </a:t>
-            </a:r>
-            <a:r>
-              <a:rPr lang="en-US" b="1" dirty="0"/>
-              <a:t>2:</a:t>
-            </a:r>
-            <a:r>
-              <a:rPr lang="en-US" dirty="0"/>
-              <a:t> Fit the </a:t>
-            </a:r>
-            <a:r>
-              <a:rPr lang="en-US" dirty="0" smtClean="0"/>
-              <a:t>model</a:t>
-            </a:r>
-            <a:endParaRPr lang="en-US" dirty="0"/>
-          </a:p>
-          <a:p>
-            <a:r>
-              <a:rPr lang="en-US" b="1" dirty="0" smtClean="0"/>
-              <a:t>Step </a:t>
-            </a:r>
-            <a:r>
-              <a:rPr lang="en-US" b="1" dirty="0"/>
-              <a:t>3: </a:t>
-            </a:r>
-            <a:r>
-              <a:rPr lang="en-US" dirty="0"/>
-              <a:t>Ask for </a:t>
-            </a:r>
-            <a:r>
-              <a:rPr lang="en-US" dirty="0" smtClean="0"/>
-              <a:t>the output </a:t>
-            </a:r>
-            <a:r>
-              <a:rPr lang="en-US" dirty="0"/>
-              <a:t>you want</a:t>
-            </a:r>
-          </a:p>
-          <a:p>
-            <a:pPr lvl="1"/>
-            <a:endParaRPr lang="en-US" dirty="0" smtClean="0"/>
           </a:p>
         </p:txBody>
       </p:sp>
@@ -6855,13 +6592,6 @@
   <p:clrMapOvr>
     <a:masterClrMapping/>
   </p:clrMapOvr>
-  <p:timing>
-    <p:tnLst>
-      <p:par>
-        <p:cTn id="1" dur="indefinite" restart="never" nodeType="tmRoot"/>
-      </p:par>
-    </p:tnLst>
-  </p:timing>
 </p:sld>
 </file>
 
@@ -6928,17 +6658,16 @@
           <a:lstStyle/>
           <a:p>
             <a:r>
-              <a:rPr lang="en-US" dirty="0" smtClean="0"/>
+              <a:rPr lang="en-US" dirty="0"/>
               <a:t>Step 1: </a:t>
             </a:r>
             <a:br>
-              <a:rPr lang="en-US" dirty="0" smtClean="0"/>
+              <a:rPr lang="en-US" dirty="0"/>
             </a:br>
             <a:r>
-              <a:rPr lang="en-US" dirty="0" smtClean="0"/>
+              <a:rPr lang="en-US" dirty="0"/>
               <a:t>Specify the Model</a:t>
             </a:r>
-            <a:endParaRPr lang="en-US" dirty="0"/>
           </a:p>
         </p:txBody>
       </p:sp>
@@ -6982,13 +6711,6 @@
   <p:clrMapOvr>
     <a:masterClrMapping/>
   </p:clrMapOvr>
-  <p:timing>
-    <p:tnLst>
-      <p:par>
-        <p:cTn id="1" dur="indefinite" restart="never" nodeType="tmRoot"/>
-      </p:par>
-    </p:tnLst>
-  </p:timing>
 </p:sld>
 </file>
 
@@ -7055,17 +6777,16 @@
           <a:lstStyle/>
           <a:p>
             <a:r>
-              <a:rPr lang="en-US" dirty="0" smtClean="0"/>
+              <a:rPr lang="en-US" dirty="0"/>
               <a:t>Step 2: </a:t>
             </a:r>
             <a:br>
-              <a:rPr lang="en-US" dirty="0" smtClean="0"/>
+              <a:rPr lang="en-US" dirty="0"/>
             </a:br>
             <a:r>
-              <a:rPr lang="en-US" dirty="0" smtClean="0"/>
+              <a:rPr lang="en-US" dirty="0"/>
               <a:t>Fit the Model</a:t>
             </a:r>
-            <a:endParaRPr lang="en-US" dirty="0"/>
           </a:p>
         </p:txBody>
       </p:sp>
@@ -7109,13 +6830,6 @@
   <p:clrMapOvr>
     <a:masterClrMapping/>
   </p:clrMapOvr>
-  <p:timing>
-    <p:tnLst>
-      <p:par>
-        <p:cTn id="1" dur="indefinite" restart="never" nodeType="tmRoot"/>
-      </p:par>
-    </p:tnLst>
-  </p:timing>
 </p:sld>
 </file>
 
@@ -7189,25 +6903,25 @@
           <a:lstStyle/>
           <a:p>
             <a:r>
-              <a:rPr lang="en-US" dirty="0" smtClean="0"/>
+              <a:rPr lang="en-US" dirty="0"/>
               <a:t>Step 3: </a:t>
             </a:r>
             <a:br>
-              <a:rPr lang="en-US" dirty="0" smtClean="0"/>
+              <a:rPr lang="en-US" dirty="0"/>
             </a:br>
             <a:r>
-              <a:rPr lang="en-US" dirty="0" smtClean="0"/>
+              <a:rPr lang="en-US" dirty="0"/>
               <a:t>Ask for </a:t>
             </a:r>
             <a:r>
-              <a:rPr lang="en-US" smtClean="0"/>
+              <a:rPr lang="en-US"/>
               <a:t>the output </a:t>
             </a:r>
             <a:br>
-              <a:rPr lang="en-US" smtClean="0"/>
+              <a:rPr lang="en-US"/>
             </a:br>
             <a:r>
-              <a:rPr lang="en-US" smtClean="0"/>
+              <a:rPr lang="en-US"/>
               <a:t>you want</a:t>
             </a:r>
             <a:endParaRPr lang="en-US" dirty="0"/>
@@ -7344,13 +7058,6 @@
   <p:clrMapOvr>
     <a:masterClrMapping/>
   </p:clrMapOvr>
-  <p:timing>
-    <p:tnLst>
-      <p:par>
-        <p:cTn id="1" dur="indefinite" restart="never" nodeType="tmRoot"/>
-      </p:par>
-    </p:tnLst>
-  </p:timing>
 </p:sld>
 </file>
 
@@ -7387,10 +7094,9 @@
           <a:lstStyle/>
           <a:p>
             <a:r>
-              <a:rPr lang="en-US" dirty="0" smtClean="0"/>
+              <a:rPr lang="en-US" dirty="0"/>
               <a:t>Path Analysis and SEM</a:t>
             </a:r>
-            <a:endParaRPr lang="en-US" dirty="0"/>
           </a:p>
         </p:txBody>
       </p:sp>
@@ -7410,45 +7116,43 @@
           <a:lstStyle/>
           <a:p>
             <a:r>
-              <a:rPr lang="en-US" dirty="0" smtClean="0"/>
+              <a:rPr lang="en-US" dirty="0"/>
               <a:t>Now we can add regression equations in the mix with our latent variables. </a:t>
             </a:r>
-            <a:endParaRPr lang="en-US" dirty="0"/>
-          </a:p>
-          <a:p>
-            <a:r>
-              <a:rPr lang="en-US" dirty="0" smtClean="0"/>
+          </a:p>
+          <a:p>
+            <a:r>
+              <a:rPr lang="en-US" dirty="0"/>
               <a:t>We can use our latent variables as predictors (IVs) or as response variables (DVs).</a:t>
             </a:r>
           </a:p>
           <a:p>
             <a:r>
-              <a:rPr lang="en-US" dirty="0" smtClean="0"/>
+              <a:rPr lang="en-US" dirty="0"/>
               <a:t>Simultaneously estimate multiple regression equations</a:t>
             </a:r>
           </a:p>
           <a:p>
             <a:pPr lvl="1"/>
             <a:r>
-              <a:rPr lang="en-US" dirty="0" smtClean="0"/>
+              <a:rPr lang="en-US" dirty="0"/>
               <a:t>A </a:t>
             </a:r>
             <a:r>
-              <a:rPr lang="en-US" b="1" dirty="0" smtClean="0"/>
+              <a:rPr lang="en-US" b="1" dirty="0"/>
               <a:t>multivariate data analysis </a:t>
             </a:r>
             <a:r>
-              <a:rPr lang="en-US" dirty="0" smtClean="0"/>
+              <a:rPr lang="en-US" dirty="0"/>
               <a:t>approach because we can have multiple response variables.  </a:t>
             </a:r>
           </a:p>
           <a:p>
             <a:pPr lvl="1"/>
             <a:r>
-              <a:rPr lang="en-US" dirty="0" smtClean="0"/>
+              <a:rPr lang="en-US" dirty="0"/>
               <a:t>Think solving a system of equations!</a:t>
             </a:r>
-            <a:endParaRPr lang="en-US" dirty="0"/>
           </a:p>
         </p:txBody>
       </p:sp>
@@ -7492,13 +7196,6 @@
   <p:clrMapOvr>
     <a:masterClrMapping/>
   </p:clrMapOvr>
-  <p:timing>
-    <p:tnLst>
-      <p:par>
-        <p:cTn id="1" dur="indefinite" restart="never" nodeType="tmRoot"/>
-      </p:par>
-    </p:tnLst>
-  </p:timing>
 </p:sld>
 </file>
 
@@ -7535,10 +7232,9 @@
           <a:lstStyle/>
           <a:p>
             <a:r>
-              <a:rPr lang="en-US" dirty="0" smtClean="0"/>
+              <a:rPr lang="en-US" dirty="0"/>
               <a:t>Path Analysis and SEM</a:t>
             </a:r>
-            <a:endParaRPr lang="en-US" dirty="0"/>
           </a:p>
         </p:txBody>
       </p:sp>
@@ -7581,13 +7277,6 @@
   <p:clrMapOvr>
     <a:masterClrMapping/>
   </p:clrMapOvr>
-  <p:timing>
-    <p:tnLst>
-      <p:par>
-        <p:cTn id="1" dur="indefinite" restart="never" nodeType="tmRoot"/>
-      </p:par>
-    </p:tnLst>
-  </p:timing>
 </p:sld>
 </file>
 
@@ -7632,10 +7321,9 @@
               </a:spcBef>
             </a:pPr>
             <a:r>
-              <a:rPr lang="en-US" dirty="0" smtClean="0"/>
+              <a:rPr lang="en-US" dirty="0"/>
               <a:t>R Markdown file</a:t>
             </a:r>
-            <a:endParaRPr lang="en-US" dirty="0"/>
           </a:p>
         </p:txBody>
       </p:sp>
@@ -7668,13 +7356,6 @@
   <p:clrMapOvr>
     <a:masterClrMapping/>
   </p:clrMapOvr>
-  <p:timing>
-    <p:tnLst>
-      <p:par>
-        <p:cTn id="1" dur="indefinite" restart="never" nodeType="tmRoot"/>
-      </p:par>
-    </p:tnLst>
-  </p:timing>
 </p:sld>
 </file>
 
@@ -7720,13 +7401,8 @@
             </a:pPr>
             <a:r>
               <a:rPr lang="en-US" dirty="0"/>
-              <a:t>ANOVA and </a:t>
-            </a:r>
-            <a:r>
-              <a:rPr lang="en-US" dirty="0" smtClean="0"/>
-              <a:t>Regression</a:t>
-            </a:r>
-            <a:endParaRPr lang="en-US" dirty="0"/>
+              <a:t>ANOVA and Regression</a:t>
+            </a:r>
           </a:p>
         </p:txBody>
       </p:sp>
@@ -7748,18 +7424,18 @@
           <a:lstStyle/>
           <a:p>
             <a:r>
-              <a:rPr lang="en-US" b="1" dirty="0" smtClean="0"/>
+              <a:rPr lang="en-US" b="1" dirty="0"/>
               <a:t>Analysis of Variance (ANOVA)</a:t>
             </a:r>
             <a:r>
-              <a:rPr lang="en-US" dirty="0" smtClean="0"/>
+              <a:rPr lang="en-US" dirty="0"/>
               <a:t> is used to compare the means of a numerical variable across levels of a categorical variable (3+ levels)</a:t>
             </a:r>
           </a:p>
           <a:p>
             <a:pPr lvl="1"/>
             <a:r>
-              <a:rPr lang="en-US" dirty="0" smtClean="0"/>
+              <a:rPr lang="en-US" dirty="0"/>
               <a:t>Only 2 levels, what test do we use?</a:t>
             </a:r>
           </a:p>
@@ -7769,27 +7445,26 @@
           </a:p>
           <a:p>
             <a:r>
-              <a:rPr lang="en-US" b="1" dirty="0" smtClean="0"/>
+              <a:rPr lang="en-US" b="1" dirty="0"/>
               <a:t>Simple Linear Regression (SLR)</a:t>
             </a:r>
             <a:r>
-              <a:rPr lang="en-US" dirty="0" smtClean="0"/>
+              <a:rPr lang="en-US" dirty="0"/>
               <a:t> is used to find the relationship between one numerical predictor variable and one numerical response (outcome or DV) variable. </a:t>
             </a:r>
           </a:p>
           <a:p>
-            <a:endParaRPr lang="en-US" dirty="0" smtClean="0"/>
-          </a:p>
-          <a:p>
-            <a:r>
-              <a:rPr lang="en-US" b="1" dirty="0" smtClean="0"/>
+            <a:endParaRPr lang="en-US" dirty="0"/>
+          </a:p>
+          <a:p>
+            <a:r>
+              <a:rPr lang="en-US" b="1" dirty="0"/>
               <a:t>Multiple Regression</a:t>
             </a:r>
             <a:r>
-              <a:rPr lang="en-US" dirty="0" smtClean="0"/>
+              <a:rPr lang="en-US" dirty="0"/>
               <a:t> is used to find the relationship between predictor and response controlling for other variables. </a:t>
             </a:r>
-            <a:endParaRPr lang="en-US" dirty="0"/>
           </a:p>
         </p:txBody>
       </p:sp>
@@ -7803,13 +7478,6 @@
   <p:clrMapOvr>
     <a:masterClrMapping/>
   </p:clrMapOvr>
-  <p:timing>
-    <p:tnLst>
-      <p:par>
-        <p:cTn id="1" dur="indefinite" restart="never" nodeType="tmRoot"/>
-      </p:par>
-    </p:tnLst>
-  </p:timing>
 </p:sld>
 </file>
 
@@ -7855,13 +7523,8 @@
             </a:pPr>
             <a:r>
               <a:rPr lang="en-US" dirty="0"/>
-              <a:t>ANOVA and </a:t>
-            </a:r>
-            <a:r>
-              <a:rPr lang="en-US" dirty="0" smtClean="0"/>
-              <a:t>Regression</a:t>
-            </a:r>
-            <a:endParaRPr lang="en-US" dirty="0"/>
+              <a:t>ANOVA and Regression</a:t>
+            </a:r>
           </a:p>
         </p:txBody>
       </p:sp>
@@ -7883,29 +7546,29 @@
           <a:lstStyle/>
           <a:p>
             <a:r>
-              <a:rPr lang="en-US" b="1" dirty="0" smtClean="0"/>
+              <a:rPr lang="en-US" b="1" dirty="0"/>
               <a:t>Logistic Regression</a:t>
             </a:r>
             <a:r>
-              <a:rPr lang="en-US" dirty="0" smtClean="0"/>
+              <a:rPr lang="en-US" dirty="0"/>
               <a:t> is used to model the probability of being in a certain group based on numerical predictors. </a:t>
             </a:r>
           </a:p>
           <a:p>
             <a:pPr lvl="1"/>
             <a:r>
-              <a:rPr lang="en-US" dirty="0" smtClean="0"/>
+              <a:rPr lang="en-US" dirty="0"/>
               <a:t>i.e., The response variable is dichotomous</a:t>
             </a:r>
           </a:p>
           <a:p>
             <a:pPr lvl="1"/>
             <a:r>
-              <a:rPr lang="en-US" dirty="0" smtClean="0"/>
+              <a:rPr lang="en-US" dirty="0"/>
               <a:t>This is called a </a:t>
             </a:r>
             <a:r>
-              <a:rPr lang="en-US" b="1" dirty="0" smtClean="0"/>
+              <a:rPr lang="en-US" b="1" dirty="0"/>
               <a:t>Generalized Linear Model (GLM)</a:t>
             </a:r>
           </a:p>
@@ -7915,7 +7578,7 @@
           </a:p>
           <a:p>
             <a:r>
-              <a:rPr lang="en-US" b="1" dirty="0" smtClean="0">
+              <a:rPr lang="en-US" b="1" dirty="0">
                 <a:latin typeface="Symbol" charset="2"/>
                 <a:ea typeface="Symbol" charset="2"/>
                 <a:cs typeface="Symbol" charset="2"/>
@@ -7923,25 +7586,24 @@
               <a:t>c</a:t>
             </a:r>
             <a:r>
-              <a:rPr lang="en-US" b="1" baseline="30000" dirty="0" smtClean="0"/>
+              <a:rPr lang="en-US" b="1" baseline="30000" dirty="0"/>
               <a:t>2</a:t>
             </a:r>
             <a:r>
-              <a:rPr lang="en-US" b="1" dirty="0" smtClean="0"/>
+              <a:rPr lang="en-US" b="1" dirty="0"/>
               <a:t>-Test (Chi-squared Test)</a:t>
             </a:r>
             <a:r>
-              <a:rPr lang="en-US" dirty="0" smtClean="0"/>
+              <a:rPr lang="en-US" dirty="0"/>
               <a:t> is used to test if two categorical variables are associated. </a:t>
             </a:r>
           </a:p>
           <a:p>
             <a:pPr lvl="1"/>
             <a:r>
-              <a:rPr lang="en-US" dirty="0" smtClean="0"/>
+              <a:rPr lang="en-US" dirty="0"/>
               <a:t>For example, is the distribution of education levels more skewed towards higher degrees for men than for women?</a:t>
             </a:r>
-            <a:endParaRPr lang="en-US" dirty="0"/>
           </a:p>
         </p:txBody>
       </p:sp>
@@ -7955,13 +7617,6 @@
   <p:clrMapOvr>
     <a:masterClrMapping/>
   </p:clrMapOvr>
-  <p:timing>
-    <p:tnLst>
-      <p:par>
-        <p:cTn id="1" dur="indefinite" restart="never" nodeType="tmRoot"/>
-      </p:par>
-    </p:tnLst>
-  </p:timing>
 </p:sld>
 </file>
 
@@ -7998,10 +7653,9 @@
           <a:lstStyle/>
           <a:p>
             <a:r>
-              <a:rPr lang="en-US" dirty="0" smtClean="0"/>
+              <a:rPr lang="en-US" dirty="0"/>
               <a:t>ANOVA and Regression</a:t>
             </a:r>
-            <a:endParaRPr lang="en-US" dirty="0"/>
           </a:p>
         </p:txBody>
       </p:sp>
@@ -8031,9 +7685,27 @@
                 <a:tableStyleId>{5C22544A-7EE6-4342-B048-85BDC9FD1C3A}</a:tableStyleId>
               </a:tblPr>
               <a:tblGrid>
-                <a:gridCol w="3512365"/>
-                <a:gridCol w="3468143"/>
-                <a:gridCol w="3556587"/>
+                <a:gridCol w="3512365">
+                  <a:extLst>
+                    <a:ext uri="{9D8B030D-6E8A-4147-A177-3AD203B41FA5}">
+                      <a16:colId xmlns:a16="http://schemas.microsoft.com/office/drawing/2014/main" val="20000"/>
+                    </a:ext>
+                  </a:extLst>
+                </a:gridCol>
+                <a:gridCol w="3468143">
+                  <a:extLst>
+                    <a:ext uri="{9D8B030D-6E8A-4147-A177-3AD203B41FA5}">
+                      <a16:colId xmlns:a16="http://schemas.microsoft.com/office/drawing/2014/main" val="20001"/>
+                    </a:ext>
+                  </a:extLst>
+                </a:gridCol>
+                <a:gridCol w="3556587">
+                  <a:extLst>
+                    <a:ext uri="{9D8B030D-6E8A-4147-A177-3AD203B41FA5}">
+                      <a16:colId xmlns:a16="http://schemas.microsoft.com/office/drawing/2014/main" val="20002"/>
+                    </a:ext>
+                  </a:extLst>
+                </a:gridCol>
               </a:tblGrid>
               <a:tr h="422398">
                 <a:tc>
@@ -8074,14 +7746,14 @@
                     <a:p>
                       <a:pPr algn="ctr"/>
                       <a:r>
-                        <a:rPr lang="en-US" sz="2800" baseline="0" dirty="0" smtClean="0"/>
+                        <a:rPr lang="en-US" sz="2800" baseline="0" dirty="0"/>
                         <a:t>Response </a:t>
                       </a:r>
                     </a:p>
                     <a:p>
                       <a:pPr algn="ctr"/>
                       <a:r>
-                        <a:rPr lang="en-US" sz="2000" baseline="0" dirty="0" smtClean="0"/>
+                        <a:rPr lang="en-US" sz="2000" baseline="0" dirty="0"/>
                         <a:t>(DV or outcome variable)</a:t>
                       </a:r>
                       <a:endParaRPr lang="en-US" sz="2000" dirty="0"/>
@@ -8120,6 +7792,11 @@
                   </a:txBody>
                   <a:tcPr/>
                 </a:tc>
+                <a:extLst>
+                  <a:ext uri="{0D108BD9-81ED-4DB2-BD59-A6C34878D82A}">
+                    <a16:rowId xmlns:a16="http://schemas.microsoft.com/office/drawing/2014/main" val="10000"/>
+                  </a:ext>
+                </a:extLst>
               </a:tr>
               <a:tr h="433203">
                 <a:tc>
@@ -8129,7 +7806,7 @@
                     <a:p>
                       <a:pPr algn="ctr"/>
                       <a:r>
-                        <a:rPr lang="en-US" sz="2800" b="1" dirty="0" smtClean="0">
+                        <a:rPr lang="en-US" sz="2800" b="1" dirty="0">
                           <a:solidFill>
                             <a:schemeClr val="bg1"/>
                           </a:solidFill>
@@ -8140,7 +7817,7 @@
                     <a:p>
                       <a:pPr algn="ctr"/>
                       <a:r>
-                        <a:rPr lang="en-US" sz="2000" b="1" dirty="0" smtClean="0">
+                        <a:rPr lang="en-US" sz="2000" b="1" dirty="0">
                           <a:solidFill>
                             <a:schemeClr val="bg1"/>
                           </a:solidFill>
@@ -8148,7 +7825,7 @@
                         <a:t>(IV</a:t>
                       </a:r>
                       <a:r>
-                        <a:rPr lang="en-US" sz="2000" b="1" baseline="0" dirty="0" smtClean="0">
+                        <a:rPr lang="en-US" sz="2000" b="1" baseline="0" dirty="0">
                           <a:solidFill>
                             <a:schemeClr val="bg1"/>
                           </a:solidFill>
@@ -8195,18 +7872,13 @@
                     <a:p>
                       <a:pPr algn="ctr"/>
                       <a:r>
-                        <a:rPr lang="en-US" sz="2400" dirty="0" smtClean="0">
+                        <a:rPr lang="en-US" sz="2400" dirty="0">
                           <a:solidFill>
                             <a:schemeClr val="tx1"/>
                           </a:solidFill>
                         </a:rPr>
                         <a:t>Numerical</a:t>
                       </a:r>
-                      <a:endParaRPr lang="en-US" sz="2400" dirty="0">
-                        <a:solidFill>
-                          <a:schemeClr val="tx1"/>
-                        </a:solidFill>
-                      </a:endParaRPr>
                     </a:p>
                   </a:txBody>
                   <a:tcPr anchor="b">
@@ -8251,7 +7923,7 @@
                     <a:p>
                       <a:pPr algn="ctr"/>
                       <a:r>
-                        <a:rPr lang="en-US" sz="2400" dirty="0" smtClean="0">
+                        <a:rPr lang="en-US" sz="2400" dirty="0">
                           <a:solidFill>
                             <a:schemeClr val="tx1"/>
                           </a:solidFill>
@@ -8262,7 +7934,7 @@
                     <a:p>
                       <a:pPr algn="ctr"/>
                       <a:r>
-                        <a:rPr lang="en-US" sz="2000" dirty="0" smtClean="0">
+                        <a:rPr lang="en-US" sz="2000" dirty="0">
                           <a:solidFill>
                             <a:schemeClr val="tx1"/>
                           </a:solidFill>
@@ -8270,7 +7942,7 @@
                         <a:t>(2 levels:</a:t>
                       </a:r>
                       <a:r>
-                        <a:rPr lang="en-US" sz="2000" baseline="0" dirty="0" smtClean="0">
+                        <a:rPr lang="en-US" sz="2000" baseline="0" dirty="0">
                           <a:solidFill>
                             <a:schemeClr val="tx1"/>
                           </a:solidFill>
@@ -8278,18 +7950,13 @@
                         <a:t> </a:t>
                       </a:r>
                       <a:r>
-                        <a:rPr lang="en-US" sz="2000" dirty="0" smtClean="0">
+                        <a:rPr lang="en-US" sz="2000" dirty="0">
                           <a:solidFill>
                             <a:schemeClr val="tx1"/>
                           </a:solidFill>
                         </a:rPr>
                         <a:t>dichotomous)</a:t>
                       </a:r>
-                      <a:endParaRPr lang="en-US" sz="2000" dirty="0">
-                        <a:solidFill>
-                          <a:schemeClr val="tx1"/>
-                        </a:solidFill>
-                      </a:endParaRPr>
                     </a:p>
                   </a:txBody>
                   <a:tcPr anchor="b">
@@ -8327,6 +7994,11 @@
                     </a:solidFill>
                   </a:tcPr>
                 </a:tc>
+                <a:extLst>
+                  <a:ext uri="{0D108BD9-81ED-4DB2-BD59-A6C34878D82A}">
+                    <a16:rowId xmlns:a16="http://schemas.microsoft.com/office/drawing/2014/main" val="10001"/>
+                  </a:ext>
+                </a:extLst>
               </a:tr>
               <a:tr h="657936">
                 <a:tc>
@@ -8336,15 +8008,15 @@
                     <a:p>
                       <a:pPr algn="l"/>
                       <a:r>
-                        <a:rPr lang="en-US" sz="2400" dirty="0" smtClean="0"/>
+                        <a:rPr lang="en-US" sz="2400" dirty="0"/>
                         <a:t>Categorical</a:t>
                       </a:r>
                       <a:r>
-                        <a:rPr lang="en-US" sz="2400" baseline="0" dirty="0" smtClean="0"/>
+                        <a:rPr lang="en-US" sz="2400" baseline="0" dirty="0"/>
                         <a:t> </a:t>
                       </a:r>
                       <a:r>
-                        <a:rPr lang="en-US" sz="2000" baseline="0" dirty="0" smtClean="0"/>
+                        <a:rPr lang="en-US" sz="2000" baseline="0" dirty="0"/>
                         <a:t>(levels = 2)</a:t>
                       </a:r>
                       <a:endParaRPr lang="en-US" sz="2000" dirty="0"/>
@@ -8386,10 +8058,9 @@
                     <a:p>
                       <a:pPr algn="ctr"/>
                       <a:r>
-                        <a:rPr lang="en-US" sz="2400" dirty="0" smtClean="0"/>
+                        <a:rPr lang="en-US" sz="2400" dirty="0"/>
                         <a:t>t-Test</a:t>
                       </a:r>
-                      <a:endParaRPr lang="en-US" sz="2400" dirty="0"/>
                     </a:p>
                   </a:txBody>
                   <a:tcPr anchor="ctr">
@@ -8428,7 +8099,7 @@
                     <a:p>
                       <a:pPr algn="ctr"/>
                       <a:r>
-                        <a:rPr lang="en-US" sz="2400" dirty="0" smtClean="0">
+                        <a:rPr lang="en-US" sz="2400" dirty="0">
                           <a:latin typeface="Symbol" charset="2"/>
                           <a:ea typeface="Symbol" charset="2"/>
                           <a:cs typeface="Symbol" charset="2"/>
@@ -8436,19 +8107,19 @@
                         <a:t>c</a:t>
                       </a:r>
                       <a:r>
-                        <a:rPr lang="en-US" sz="2400" baseline="30000" dirty="0" smtClean="0"/>
+                        <a:rPr lang="en-US" sz="2400" baseline="30000" dirty="0"/>
                         <a:t>2</a:t>
                       </a:r>
                       <a:r>
-                        <a:rPr lang="en-US" sz="2400" dirty="0" smtClean="0"/>
+                        <a:rPr lang="en-US" sz="2400" dirty="0"/>
                         <a:t>-</a:t>
                       </a:r>
                       <a:r>
-                        <a:rPr lang="en-US" sz="2400" baseline="0" dirty="0" smtClean="0"/>
+                        <a:rPr lang="en-US" sz="2400" baseline="0" dirty="0"/>
                         <a:t>Test </a:t>
                       </a:r>
                       <a:r>
-                        <a:rPr lang="en-US" sz="2000" baseline="0" dirty="0" smtClean="0">
+                        <a:rPr lang="en-US" sz="2000" baseline="0" dirty="0">
                           <a:solidFill>
                             <a:schemeClr val="tx1">
                               <a:lumMod val="50000"/>
@@ -8497,6 +8168,11 @@
                     </a:lnBlToTr>
                   </a:tcPr>
                 </a:tc>
+                <a:extLst>
+                  <a:ext uri="{0D108BD9-81ED-4DB2-BD59-A6C34878D82A}">
+                    <a16:rowId xmlns:a16="http://schemas.microsoft.com/office/drawing/2014/main" val="10002"/>
+                  </a:ext>
+                </a:extLst>
               </a:tr>
               <a:tr h="657936">
                 <a:tc>
@@ -8506,11 +8182,11 @@
                     <a:p>
                       <a:pPr algn="l"/>
                       <a:r>
-                        <a:rPr lang="en-US" sz="2400" dirty="0" smtClean="0"/>
+                        <a:rPr lang="en-US" sz="2400" dirty="0"/>
                         <a:t>1</a:t>
                       </a:r>
                       <a:r>
-                        <a:rPr lang="en-US" sz="2400" baseline="0" dirty="0" smtClean="0"/>
+                        <a:rPr lang="en-US" sz="2400" baseline="0" dirty="0"/>
                         <a:t> Numerical</a:t>
                       </a:r>
                       <a:endParaRPr lang="en-US" sz="2400" dirty="0"/>
@@ -8552,10 +8228,9 @@
                     <a:p>
                       <a:pPr algn="ctr"/>
                       <a:r>
-                        <a:rPr lang="en-US" sz="2400" dirty="0" smtClean="0"/>
+                        <a:rPr lang="en-US" sz="2400" dirty="0"/>
                         <a:t>SLR</a:t>
                       </a:r>
-                      <a:endParaRPr lang="en-US" sz="2400" dirty="0"/>
                     </a:p>
                   </a:txBody>
                   <a:tcPr anchor="ctr">
@@ -8594,10 +8269,9 @@
                     <a:p>
                       <a:pPr algn="ctr"/>
                       <a:r>
-                        <a:rPr lang="en-US" sz="2400" dirty="0" smtClean="0"/>
+                        <a:rPr lang="en-US" sz="2400" dirty="0"/>
                         <a:t>Logistic Regression</a:t>
                       </a:r>
-                      <a:endParaRPr lang="en-US" sz="2400" dirty="0"/>
                     </a:p>
                   </a:txBody>
                   <a:tcPr anchor="ctr">
@@ -8629,6 +8303,11 @@
                     </a:lnBlToTr>
                   </a:tcPr>
                 </a:tc>
+                <a:extLst>
+                  <a:ext uri="{0D108BD9-81ED-4DB2-BD59-A6C34878D82A}">
+                    <a16:rowId xmlns:a16="http://schemas.microsoft.com/office/drawing/2014/main" val="10003"/>
+                  </a:ext>
+                </a:extLst>
               </a:tr>
               <a:tr h="657936">
                 <a:tc>
@@ -8638,11 +8317,11 @@
                     <a:p>
                       <a:pPr algn="l"/>
                       <a:r>
-                        <a:rPr lang="en-US" sz="2400" dirty="0" smtClean="0"/>
+                        <a:rPr lang="en-US" sz="2400" dirty="0"/>
                         <a:t>Categorical </a:t>
                       </a:r>
                       <a:r>
-                        <a:rPr lang="en-US" sz="2000" dirty="0" smtClean="0"/>
+                        <a:rPr lang="en-US" sz="2000" dirty="0"/>
                         <a:t>(levels &gt;= 3)</a:t>
                       </a:r>
                       <a:endParaRPr lang="en-US" sz="2400" dirty="0"/>
@@ -8684,10 +8363,9 @@
                     <a:p>
                       <a:pPr algn="ctr"/>
                       <a:r>
-                        <a:rPr lang="en-US" sz="2400" dirty="0" smtClean="0"/>
+                        <a:rPr lang="en-US" sz="2400" dirty="0"/>
                         <a:t>ANOVA</a:t>
                       </a:r>
-                      <a:endParaRPr lang="en-US" sz="2400" dirty="0"/>
                     </a:p>
                   </a:txBody>
                   <a:tcPr anchor="ctr">
@@ -8742,7 +8420,7 @@
                         <a:defRPr/>
                       </a:pPr>
                       <a:r>
-                        <a:rPr lang="en-US" sz="2400" dirty="0" smtClean="0">
+                        <a:rPr lang="en-US" sz="2400" dirty="0">
                           <a:latin typeface="Symbol" charset="2"/>
                           <a:ea typeface="Symbol" charset="2"/>
                           <a:cs typeface="Symbol" charset="2"/>
@@ -8750,18 +8428,18 @@
                         <a:t>c</a:t>
                       </a:r>
                       <a:r>
-                        <a:rPr lang="en-US" sz="2400" baseline="30000" dirty="0" smtClean="0"/>
+                        <a:rPr lang="en-US" sz="2400" baseline="30000" dirty="0"/>
                         <a:t>2</a:t>
                       </a:r>
                       <a:r>
-                        <a:rPr lang="en-US" sz="2400" dirty="0" smtClean="0"/>
+                        <a:rPr lang="en-US" sz="2400" dirty="0"/>
                         <a:t>-</a:t>
                       </a:r>
                       <a:r>
-                        <a:rPr lang="en-US" sz="2400" baseline="0" dirty="0" smtClean="0"/>
+                        <a:rPr lang="en-US" sz="2400" baseline="0" dirty="0"/>
                         <a:t>Test</a:t>
                       </a:r>
-                      <a:endParaRPr lang="en-US" sz="2400" dirty="0" smtClean="0"/>
+                      <a:endParaRPr lang="en-US" sz="2400" dirty="0"/>
                     </a:p>
                   </a:txBody>
                   <a:tcPr anchor="ctr">
@@ -8793,6 +8471,11 @@
                     </a:lnBlToTr>
                   </a:tcPr>
                 </a:tc>
+                <a:extLst>
+                  <a:ext uri="{0D108BD9-81ED-4DB2-BD59-A6C34878D82A}">
+                    <a16:rowId xmlns:a16="http://schemas.microsoft.com/office/drawing/2014/main" val="10004"/>
+                  </a:ext>
+                </a:extLst>
               </a:tr>
               <a:tr h="657936">
                 <a:tc>
@@ -8802,10 +8485,9 @@
                     <a:p>
                       <a:pPr algn="l"/>
                       <a:r>
-                        <a:rPr lang="en-US" sz="2400" dirty="0" smtClean="0"/>
+                        <a:rPr lang="en-US" sz="2400" dirty="0"/>
                         <a:t>2 or more Numerical</a:t>
                       </a:r>
-                      <a:endParaRPr lang="en-US" sz="2400" dirty="0"/>
                     </a:p>
                   </a:txBody>
                   <a:tcPr anchor="ctr">
@@ -8844,10 +8526,9 @@
                     <a:p>
                       <a:pPr algn="ctr"/>
                       <a:r>
-                        <a:rPr lang="en-US" sz="2400" dirty="0" smtClean="0"/>
+                        <a:rPr lang="en-US" sz="2400" dirty="0"/>
                         <a:t>Multiple Regression</a:t>
                       </a:r>
-                      <a:endParaRPr lang="en-US" sz="2400" dirty="0"/>
                     </a:p>
                   </a:txBody>
                   <a:tcPr anchor="ctr">
@@ -8886,10 +8567,9 @@
                     <a:p>
                       <a:pPr algn="ctr"/>
                       <a:r>
-                        <a:rPr lang="en-US" sz="2400" dirty="0" smtClean="0"/>
+                        <a:rPr lang="en-US" sz="2400" dirty="0"/>
                         <a:t>Logistic Regression</a:t>
                       </a:r>
-                      <a:endParaRPr lang="en-US" sz="2400" dirty="0"/>
                     </a:p>
                   </a:txBody>
                   <a:tcPr anchor="ctr">
@@ -8921,6 +8601,11 @@
                     </a:lnBlToTr>
                   </a:tcPr>
                 </a:tc>
+                <a:extLst>
+                  <a:ext uri="{0D108BD9-81ED-4DB2-BD59-A6C34878D82A}">
+                    <a16:rowId xmlns:a16="http://schemas.microsoft.com/office/drawing/2014/main" val="10005"/>
+                  </a:ext>
+                </a:extLst>
               </a:tr>
             </a:tbl>
           </a:graphicData>
@@ -8936,13 +8621,6 @@
   <p:clrMapOvr>
     <a:masterClrMapping/>
   </p:clrMapOvr>
-  <p:timing>
-    <p:tnLst>
-      <p:par>
-        <p:cTn id="1" dur="indefinite" restart="never" nodeType="tmRoot"/>
-      </p:par>
-    </p:tnLst>
-  </p:timing>
 </p:sld>
 </file>
 
@@ -8979,10 +8657,9 @@
           <a:lstStyle/>
           <a:p>
             <a:r>
-              <a:rPr lang="en-US" dirty="0" smtClean="0"/>
+              <a:rPr lang="en-US" dirty="0"/>
               <a:t>ANOVA and Regression</a:t>
             </a:r>
-            <a:endParaRPr lang="en-US" dirty="0"/>
           </a:p>
         </p:txBody>
       </p:sp>
@@ -9012,8 +8689,20 @@
                 <a:tableStyleId>{5C22544A-7EE6-4342-B048-85BDC9FD1C3A}</a:tableStyleId>
               </a:tblPr>
               <a:tblGrid>
-                <a:gridCol w="4419894"/>
-                <a:gridCol w="3622040"/>
+                <a:gridCol w="4419894">
+                  <a:extLst>
+                    <a:ext uri="{9D8B030D-6E8A-4147-A177-3AD203B41FA5}">
+                      <a16:colId xmlns:a16="http://schemas.microsoft.com/office/drawing/2014/main" val="20000"/>
+                    </a:ext>
+                  </a:extLst>
+                </a:gridCol>
+                <a:gridCol w="3622040">
+                  <a:extLst>
+                    <a:ext uri="{9D8B030D-6E8A-4147-A177-3AD203B41FA5}">
+                      <a16:colId xmlns:a16="http://schemas.microsoft.com/office/drawing/2014/main" val="20001"/>
+                    </a:ext>
+                  </a:extLst>
+                </a:gridCol>
               </a:tblGrid>
               <a:tr h="589280">
                 <a:tc>
@@ -9023,18 +8712,13 @@
                     <a:p>
                       <a:pPr algn="ctr"/>
                       <a:r>
-                        <a:rPr lang="en-US" sz="2800" dirty="0" smtClean="0">
+                        <a:rPr lang="en-US" sz="2800" dirty="0">
                           <a:solidFill>
                             <a:schemeClr val="bg1"/>
                           </a:solidFill>
                         </a:rPr>
                         <a:t>Inference Test</a:t>
                       </a:r>
-                      <a:endParaRPr lang="en-US" sz="2800" dirty="0">
-                        <a:solidFill>
-                          <a:schemeClr val="bg1"/>
-                        </a:solidFill>
-                      </a:endParaRPr>
                     </a:p>
                   </a:txBody>
                   <a:tcPr anchor="b">
@@ -9074,18 +8758,13 @@
                     <a:p>
                       <a:pPr algn="ctr"/>
                       <a:r>
-                        <a:rPr lang="en-US" sz="2800" dirty="0" smtClean="0">
+                        <a:rPr lang="en-US" sz="2800" dirty="0">
                           <a:solidFill>
                             <a:schemeClr val="bg1"/>
                           </a:solidFill>
                         </a:rPr>
                         <a:t>R function</a:t>
                       </a:r>
-                      <a:endParaRPr lang="en-US" sz="2800" dirty="0">
-                        <a:solidFill>
-                          <a:schemeClr val="bg1"/>
-                        </a:solidFill>
-                      </a:endParaRPr>
                     </a:p>
                   </a:txBody>
                   <a:tcPr anchor="b">
@@ -9118,6 +8797,11 @@
                     </a:solidFill>
                   </a:tcPr>
                 </a:tc>
+                <a:extLst>
+                  <a:ext uri="{0D108BD9-81ED-4DB2-BD59-A6C34878D82A}">
+                    <a16:rowId xmlns:a16="http://schemas.microsoft.com/office/drawing/2014/main" val="10000"/>
+                  </a:ext>
+                </a:extLst>
               </a:tr>
               <a:tr h="596616">
                 <a:tc>
@@ -9127,7 +8811,7 @@
                     <a:p>
                       <a:pPr algn="ctr"/>
                       <a:r>
-                        <a:rPr lang="en-US" sz="2400" dirty="0" smtClean="0"/>
+                        <a:rPr lang="en-US" sz="2400" dirty="0"/>
                         <a:t>t-Test</a:t>
                       </a:r>
                       <a:endParaRPr lang="en-US" sz="2000" dirty="0"/>
@@ -9167,14 +8851,13 @@
                     <a:p>
                       <a:pPr algn="ctr"/>
                       <a:r>
-                        <a:rPr lang="en-US" sz="2000" dirty="0" err="1" smtClean="0"/>
+                        <a:rPr lang="en-US" sz="2000" dirty="0" err="1"/>
                         <a:t>t.test</a:t>
                       </a:r>
                       <a:r>
-                        <a:rPr lang="en-US" sz="2000" dirty="0" smtClean="0"/>
+                        <a:rPr lang="en-US" sz="2000" dirty="0"/>
                         <a:t>()</a:t>
                       </a:r>
-                      <a:endParaRPr lang="en-US" sz="2000" dirty="0"/>
                     </a:p>
                   </a:txBody>
                   <a:tcPr anchor="ctr">
@@ -9204,6 +8887,11 @@
                     </a:lnBlToTr>
                   </a:tcPr>
                 </a:tc>
+                <a:extLst>
+                  <a:ext uri="{0D108BD9-81ED-4DB2-BD59-A6C34878D82A}">
+                    <a16:rowId xmlns:a16="http://schemas.microsoft.com/office/drawing/2014/main" val="10001"/>
+                  </a:ext>
+                </a:extLst>
               </a:tr>
               <a:tr h="596616">
                 <a:tc>
@@ -9213,10 +8901,9 @@
                     <a:p>
                       <a:pPr algn="ctr"/>
                       <a:r>
-                        <a:rPr lang="en-US" sz="2400" dirty="0" smtClean="0"/>
+                        <a:rPr lang="en-US" sz="2400" dirty="0"/>
                         <a:t>ANOVA</a:t>
                       </a:r>
-                      <a:endParaRPr lang="en-US" sz="2400" dirty="0"/>
                     </a:p>
                   </a:txBody>
                   <a:tcPr anchor="ctr">
@@ -9253,14 +8940,13 @@
                     <a:p>
                       <a:pPr algn="ctr"/>
                       <a:r>
-                        <a:rPr lang="en-US" sz="2400" dirty="0" err="1" smtClean="0"/>
+                        <a:rPr lang="en-US" sz="2400" dirty="0" err="1"/>
                         <a:t>aov</a:t>
                       </a:r>
                       <a:r>
-                        <a:rPr lang="en-US" sz="2400" dirty="0" smtClean="0"/>
+                        <a:rPr lang="en-US" sz="2400" dirty="0"/>
                         <a:t>()</a:t>
                       </a:r>
-                      <a:endParaRPr lang="en-US" sz="2400" dirty="0"/>
                     </a:p>
                   </a:txBody>
                   <a:tcPr anchor="ctr">
@@ -9290,6 +8976,11 @@
                     </a:lnBlToTr>
                   </a:tcPr>
                 </a:tc>
+                <a:extLst>
+                  <a:ext uri="{0D108BD9-81ED-4DB2-BD59-A6C34878D82A}">
+                    <a16:rowId xmlns:a16="http://schemas.microsoft.com/office/drawing/2014/main" val="10002"/>
+                  </a:ext>
+                </a:extLst>
               </a:tr>
               <a:tr h="787968">
                 <a:tc>
@@ -9299,10 +8990,9 @@
                     <a:p>
                       <a:pPr algn="ctr"/>
                       <a:r>
-                        <a:rPr lang="en-US" sz="2400" dirty="0" smtClean="0"/>
+                        <a:rPr lang="en-US" sz="2400" dirty="0"/>
                         <a:t>SLR and Multiple Regression</a:t>
                       </a:r>
-                      <a:endParaRPr lang="en-US" sz="2400" dirty="0"/>
                     </a:p>
                   </a:txBody>
                   <a:tcPr anchor="ctr">
@@ -9339,10 +9029,9 @@
                     <a:p>
                       <a:pPr algn="ctr"/>
                       <a:r>
-                        <a:rPr lang="en-US" sz="2400" dirty="0" smtClean="0"/>
+                        <a:rPr lang="en-US" sz="2400" dirty="0"/>
                         <a:t>lm()</a:t>
                       </a:r>
-                      <a:endParaRPr lang="en-US" sz="2400" dirty="0"/>
                     </a:p>
                   </a:txBody>
                   <a:tcPr anchor="ctr">
@@ -9372,6 +9061,11 @@
                     </a:lnBlToTr>
                   </a:tcPr>
                 </a:tc>
+                <a:extLst>
+                  <a:ext uri="{0D108BD9-81ED-4DB2-BD59-A6C34878D82A}">
+                    <a16:rowId xmlns:a16="http://schemas.microsoft.com/office/drawing/2014/main" val="10003"/>
+                  </a:ext>
+                </a:extLst>
               </a:tr>
               <a:tr h="596616">
                 <a:tc>
@@ -9381,7 +9075,7 @@
                     <a:p>
                       <a:pPr algn="ctr"/>
                       <a:r>
-                        <a:rPr lang="en-US" sz="2400" dirty="0" smtClean="0">
+                        <a:rPr lang="en-US" sz="2400" dirty="0">
                           <a:latin typeface="Symbol" charset="2"/>
                           <a:ea typeface="Symbol" charset="2"/>
                           <a:cs typeface="Symbol" charset="2"/>
@@ -9389,14 +9083,13 @@
                         <a:t>c</a:t>
                       </a:r>
                       <a:r>
-                        <a:rPr lang="en-US" sz="2400" baseline="30000" dirty="0" smtClean="0"/>
+                        <a:rPr lang="en-US" sz="2400" baseline="30000" dirty="0"/>
                         <a:t>2</a:t>
                       </a:r>
                       <a:r>
-                        <a:rPr lang="en-US" sz="2400" dirty="0" smtClean="0"/>
+                        <a:rPr lang="en-US" sz="2400" dirty="0"/>
                         <a:t>-Test</a:t>
                       </a:r>
-                      <a:endParaRPr lang="en-US" sz="2400" dirty="0"/>
                     </a:p>
                   </a:txBody>
                   <a:tcPr anchor="ctr">
@@ -9433,14 +9126,13 @@
                     <a:p>
                       <a:pPr algn="ctr"/>
                       <a:r>
-                        <a:rPr lang="en-US" sz="2400" dirty="0" err="1" smtClean="0"/>
+                        <a:rPr lang="en-US" sz="2400" dirty="0" err="1"/>
                         <a:t>chisq.test</a:t>
                       </a:r>
                       <a:r>
-                        <a:rPr lang="en-US" sz="2400" dirty="0" smtClean="0"/>
+                        <a:rPr lang="en-US" sz="2400" dirty="0"/>
                         <a:t>()</a:t>
                       </a:r>
-                      <a:endParaRPr lang="en-US" sz="2400" dirty="0"/>
                     </a:p>
                   </a:txBody>
                   <a:tcPr anchor="ctr">
@@ -9470,6 +9162,11 @@
                     </a:lnBlToTr>
                   </a:tcPr>
                 </a:tc>
+                <a:extLst>
+                  <a:ext uri="{0D108BD9-81ED-4DB2-BD59-A6C34878D82A}">
+                    <a16:rowId xmlns:a16="http://schemas.microsoft.com/office/drawing/2014/main" val="10004"/>
+                  </a:ext>
+                </a:extLst>
               </a:tr>
               <a:tr h="746260">
                 <a:tc>
@@ -9479,10 +9176,9 @@
                     <a:p>
                       <a:pPr algn="ctr"/>
                       <a:r>
-                        <a:rPr lang="en-US" sz="2400" dirty="0" smtClean="0"/>
+                        <a:rPr lang="en-US" sz="2400" dirty="0"/>
                         <a:t>Logistic Regression</a:t>
                       </a:r>
-                      <a:endParaRPr lang="en-US" sz="2400" dirty="0"/>
                     </a:p>
                   </a:txBody>
                   <a:tcPr anchor="ctr">
@@ -9519,14 +9215,13 @@
                     <a:p>
                       <a:pPr algn="ctr"/>
                       <a:r>
-                        <a:rPr lang="en-US" sz="2400" dirty="0" err="1" smtClean="0"/>
+                        <a:rPr lang="en-US" sz="2400" dirty="0" err="1"/>
                         <a:t>glm</a:t>
                       </a:r>
                       <a:r>
-                        <a:rPr lang="en-US" sz="2400" dirty="0" smtClean="0"/>
+                        <a:rPr lang="en-US" sz="2400" dirty="0"/>
                         <a:t>()</a:t>
                       </a:r>
-                      <a:endParaRPr lang="en-US" sz="2400" dirty="0"/>
                     </a:p>
                   </a:txBody>
                   <a:tcPr anchor="ctr">
@@ -9556,6 +9251,11 @@
                     </a:lnBlToTr>
                   </a:tcPr>
                 </a:tc>
+                <a:extLst>
+                  <a:ext uri="{0D108BD9-81ED-4DB2-BD59-A6C34878D82A}">
+                    <a16:rowId xmlns:a16="http://schemas.microsoft.com/office/drawing/2014/main" val="10005"/>
+                  </a:ext>
+                </a:extLst>
               </a:tr>
             </a:tbl>
           </a:graphicData>
@@ -9571,13 +9271,6 @@
   <p:clrMapOvr>
     <a:masterClrMapping/>
   </p:clrMapOvr>
-  <p:timing>
-    <p:tnLst>
-      <p:par>
-        <p:cTn id="1" dur="indefinite" restart="never" nodeType="tmRoot"/>
-      </p:par>
-    </p:tnLst>
-  </p:timing>
 </p:sld>
 </file>
 
@@ -9622,10 +9315,9 @@
               </a:spcBef>
             </a:pPr>
             <a:r>
-              <a:rPr lang="en-US" dirty="0" smtClean="0"/>
+              <a:rPr lang="en-US" dirty="0"/>
               <a:t>R Markdown file</a:t>
             </a:r>
-            <a:endParaRPr lang="en-US" dirty="0"/>
           </a:p>
         </p:txBody>
       </p:sp>
@@ -9658,13 +9350,6 @@
   <p:clrMapOvr>
     <a:masterClrMapping/>
   </p:clrMapOvr>
-  <p:timing>
-    <p:tnLst>
-      <p:par>
-        <p:cTn id="1" dur="indefinite" restart="never" nodeType="tmRoot"/>
-      </p:par>
-    </p:tnLst>
-  </p:timing>
 </p:sld>
 </file>
 
@@ -9709,10 +9394,9 @@
               </a:spcBef>
             </a:pPr>
             <a:r>
-              <a:rPr lang="en-US" dirty="0" smtClean="0"/>
+              <a:rPr lang="en-US" dirty="0"/>
               <a:t>Preparing APA Style Manuscripts</a:t>
             </a:r>
-            <a:endParaRPr lang="en-US" dirty="0"/>
           </a:p>
         </p:txBody>
       </p:sp>
@@ -9732,10 +9416,9 @@
           <a:lstStyle/>
           <a:p>
             <a:r>
-              <a:rPr lang="en-US" dirty="0" smtClean="0"/>
+              <a:rPr lang="en-US" dirty="0"/>
               <a:t>Connie Zhang, 19’ and Emma Ning, 19’</a:t>
             </a:r>
-            <a:endParaRPr lang="en-US" dirty="0"/>
           </a:p>
         </p:txBody>
       </p:sp>
@@ -9785,10 +9468,9 @@
           <a:lstStyle/>
           <a:p>
             <a:r>
-              <a:rPr lang="en-US" dirty="0" smtClean="0"/>
+              <a:rPr lang="en-US" dirty="0"/>
               <a:t>Exploratory Factor Analysis (EFA)</a:t>
             </a:r>
-            <a:endParaRPr lang="en-US" dirty="0"/>
           </a:p>
         </p:txBody>
       </p:sp>
@@ -9810,23 +9492,23 @@
           <a:lstStyle/>
           <a:p>
             <a:r>
-              <a:rPr lang="en-US" dirty="0" smtClean="0"/>
+              <a:rPr lang="en-US" dirty="0"/>
               <a:t>Often we want to be able to describe a relatively large number of </a:t>
             </a:r>
             <a:r>
-              <a:rPr lang="en-US" b="1" dirty="0" smtClean="0"/>
+              <a:rPr lang="en-US" b="1" dirty="0"/>
               <a:t>items</a:t>
             </a:r>
             <a:r>
-              <a:rPr lang="en-US" dirty="0" smtClean="0"/>
+              <a:rPr lang="en-US" dirty="0"/>
               <a:t> by a much fewer number of </a:t>
             </a:r>
             <a:r>
-              <a:rPr lang="en-US" b="1" dirty="0" smtClean="0"/>
+              <a:rPr lang="en-US" b="1" dirty="0"/>
               <a:t>factors</a:t>
             </a:r>
             <a:r>
-              <a:rPr lang="en-US" dirty="0" smtClean="0"/>
+              <a:rPr lang="en-US" dirty="0"/>
               <a:t>. </a:t>
             </a:r>
           </a:p>
@@ -9835,15 +9517,15 @@
           </a:p>
           <a:p>
             <a:r>
-              <a:rPr lang="en-US" dirty="0" smtClean="0"/>
+              <a:rPr lang="en-US" dirty="0"/>
               <a:t>In the </a:t>
             </a:r>
             <a:r>
-              <a:rPr lang="en-US" dirty="0" err="1" smtClean="0"/>
+              <a:rPr lang="en-US" dirty="0" err="1"/>
               <a:t>bfi</a:t>
             </a:r>
             <a:r>
-              <a:rPr lang="en-US" dirty="0" smtClean="0"/>
+              <a:rPr lang="en-US" dirty="0"/>
               <a:t> dataset there are 25 items measuring personality, but are there just a few underlying factors that are responsible for people’s scores on those items?</a:t>
             </a:r>
           </a:p>
@@ -9852,15 +9534,15 @@
           </a:p>
           <a:p>
             <a:r>
-              <a:rPr lang="en-US" dirty="0" smtClean="0"/>
+              <a:rPr lang="en-US" dirty="0"/>
               <a:t>We might guess what those are (e.g., extroversion, conscientiousness, etc.), but if we didn’t know we could use </a:t>
             </a:r>
             <a:r>
-              <a:rPr lang="en-US" b="1" dirty="0" smtClean="0"/>
+              <a:rPr lang="en-US" b="1" dirty="0"/>
               <a:t>EFA</a:t>
             </a:r>
             <a:r>
-              <a:rPr lang="en-US" dirty="0" smtClean="0"/>
+              <a:rPr lang="en-US" dirty="0"/>
               <a:t> to let the data tell us about the underlying dimensions.</a:t>
             </a:r>
           </a:p>

</xml_diff>

<commit_message>
changes to slide and ggplot rmd
</commit_message>
<xml_diff>
--- a/docs/Day 2 Slides.pptx
+++ b/docs/Day 2 Slides.pptx
@@ -223,7 +223,7 @@
           <a:p>
             <a:fld id="{C1BA31B9-3973-47BB-A769-C9355840A371}" type="datetimeFigureOut">
               <a:rPr lang="en-US" smtClean="0"/>
-              <a:t>5/27/18</a:t>
+              <a:t>5/29/18</a:t>
             </a:fld>
             <a:endParaRPr lang="en-US"/>
           </a:p>
@@ -686,7 +686,7 @@
           <a:p>
             <a:fld id="{90187E87-00B9-445A-8D49-C5EA21AFF997}" type="datetime1">
               <a:rPr lang="en-US" smtClean="0"/>
-              <a:t>5/27/18</a:t>
+              <a:t>5/29/18</a:t>
             </a:fld>
             <a:endParaRPr lang="en-US"/>
           </a:p>
@@ -907,7 +907,7 @@
           <a:p>
             <a:fld id="{096F9D19-0B27-4869-88F9-365098868A7F}" type="datetime1">
               <a:rPr lang="en-US" smtClean="0"/>
-              <a:t>5/27/18</a:t>
+              <a:t>5/29/18</a:t>
             </a:fld>
             <a:endParaRPr lang="en-US"/>
           </a:p>
@@ -1087,7 +1087,7 @@
           <a:p>
             <a:fld id="{AD3B7F37-9439-40A1-AEEF-AD67BB0D4AAC}" type="datetime1">
               <a:rPr lang="en-US" smtClean="0"/>
-              <a:t>5/27/18</a:t>
+              <a:t>5/29/18</a:t>
             </a:fld>
             <a:endParaRPr lang="en-US"/>
           </a:p>
@@ -1333,7 +1333,7 @@
             </a:pPr>
             <a:fld id="{68164054-3012-482D-9EB5-FE9FE872DCFE}" type="datetime1">
               <a:rPr lang="en-US" smtClean="0"/>
-              <a:t>5/27/18</a:t>
+              <a:t>5/29/18</a:t>
             </a:fld>
             <a:endParaRPr lang="en-US"/>
           </a:p>
@@ -1530,7 +1530,7 @@
           <a:p>
             <a:fld id="{6186BA2A-CEBF-4FAC-A01D-170852E3EB13}" type="datetime1">
               <a:rPr lang="en-US" smtClean="0"/>
-              <a:t>5/27/18</a:t>
+              <a:t>5/29/18</a:t>
             </a:fld>
             <a:endParaRPr lang="en-US"/>
           </a:p>
@@ -1781,7 +1781,7 @@
           <a:p>
             <a:fld id="{B5212E68-AB57-4F56-9514-81BEE86EE853}" type="datetime1">
               <a:rPr lang="en-US" smtClean="0"/>
-              <a:t>5/27/18</a:t>
+              <a:t>5/29/18</a:t>
             </a:fld>
             <a:endParaRPr lang="en-US"/>
           </a:p>
@@ -2104,7 +2104,7 @@
           <a:p>
             <a:fld id="{E41FD155-039D-4424-A31E-3636442F6E36}" type="datetime1">
               <a:rPr lang="en-US" smtClean="0"/>
-              <a:t>5/27/18</a:t>
+              <a:t>5/29/18</a:t>
             </a:fld>
             <a:endParaRPr lang="en-US"/>
           </a:p>
@@ -2528,7 +2528,7 @@
           <a:p>
             <a:fld id="{64126646-2279-486A-B40D-6145D7D6D51B}" type="datetime1">
               <a:rPr lang="en-US" smtClean="0"/>
-              <a:t>5/27/18</a:t>
+              <a:t>5/29/18</a:t>
             </a:fld>
             <a:endParaRPr lang="en-US"/>
           </a:p>
@@ -2646,7 +2646,7 @@
           <a:p>
             <a:fld id="{EB0B8D8C-4F8E-4FB9-992A-BE6AEAF72144}" type="datetime1">
               <a:rPr lang="en-US" smtClean="0"/>
-              <a:t>5/27/18</a:t>
+              <a:t>5/29/18</a:t>
             </a:fld>
             <a:endParaRPr lang="en-US"/>
           </a:p>
@@ -2741,7 +2741,7 @@
           <a:p>
             <a:fld id="{535ABF41-E07B-4A76-B381-06013911A931}" type="datetime1">
               <a:rPr lang="en-US" smtClean="0"/>
-              <a:t>5/27/18</a:t>
+              <a:t>5/29/18</a:t>
             </a:fld>
             <a:endParaRPr lang="en-US"/>
           </a:p>
@@ -3031,7 +3031,7 @@
           <a:p>
             <a:fld id="{6FC7F623-53E3-4FED-9930-39EA7732EA27}" type="datetime1">
               <a:rPr lang="en-US" smtClean="0"/>
-              <a:t>5/27/18</a:t>
+              <a:t>5/29/18</a:t>
             </a:fld>
             <a:endParaRPr lang="en-US"/>
           </a:p>
@@ -3303,7 +3303,7 @@
           <a:p>
             <a:fld id="{FA00CAC2-29F8-40CA-B143-AB13DA75749C}" type="datetime1">
               <a:rPr lang="en-US" smtClean="0"/>
-              <a:t>5/27/18</a:t>
+              <a:t>5/29/18</a:t>
             </a:fld>
             <a:endParaRPr lang="en-US"/>
           </a:p>
@@ -3557,7 +3557,7 @@
           <a:p>
             <a:fld id="{2E5D7971-9A78-471E-B993-894E22B9485D}" type="datetime1">
               <a:rPr lang="en-US" smtClean="0"/>
-              <a:t>5/27/18</a:t>
+              <a:t>5/29/18</a:t>
             </a:fld>
             <a:endParaRPr lang="en-US"/>
           </a:p>
@@ -4032,20 +4032,26 @@
         </p:nvSpPr>
         <p:spPr/>
         <p:txBody>
-          <a:bodyPr/>
+          <a:bodyPr>
+            <a:normAutofit/>
+          </a:bodyPr>
           <a:lstStyle/>
           <a:p>
             <a:r>
+              <a:rPr lang="en-US" dirty="0" smtClean="0"/>
+              <a:t>Introduction to Data Analysis in R </a:t>
+            </a:r>
+            <a:r>
+              <a:rPr lang="mr-IN" dirty="0" smtClean="0"/>
+              <a:t>–</a:t>
+            </a:r>
+            <a:r>
+              <a:rPr lang="en-US" dirty="0" smtClean="0"/>
+              <a:t> </a:t>
+            </a:r>
+            <a:r>
               <a:rPr lang="en-US" dirty="0"/>
-              <a:t>R Workshop </a:t>
-            </a:r>
-            <a:r>
-              <a:rPr lang="mr-IN" dirty="0"/>
-              <a:t>–</a:t>
-            </a:r>
-            <a:r>
-              <a:rPr lang="en-US" dirty="0"/>
-              <a:t> </a:t>
+              <a:t/>
             </a:r>
             <a:br>
               <a:rPr lang="en-US" dirty="0"/>
@@ -4067,26 +4073,38 @@
             <p:ph type="subTitle" idx="1"/>
           </p:nvPr>
         </p:nvSpPr>
-        <p:spPr/>
-        <p:txBody>
-          <a:bodyPr/>
+        <p:spPr>
+          <a:xfrm>
+            <a:off x="1709530" y="3869634"/>
+            <a:ext cx="8767860" cy="2310102"/>
+          </a:xfrm>
+        </p:spPr>
+        <p:txBody>
+          <a:bodyPr>
+            <a:normAutofit/>
+          </a:bodyPr>
           <a:lstStyle/>
           <a:p>
             <a:r>
               <a:rPr lang="en-US" dirty="0"/>
-              <a:t>Randi L. Garcia</a:t>
-            </a:r>
+              <a:t>Randi L. </a:t>
+            </a:r>
+            <a:r>
+              <a:rPr lang="en-US" dirty="0" smtClean="0"/>
+              <a:t>Garcia, PhD</a:t>
+            </a:r>
+            <a:endParaRPr lang="en-US" dirty="0"/>
           </a:p>
           <a:p>
             <a:r>
               <a:rPr lang="en-US" dirty="0"/>
-              <a:t>Smith College</a:t>
+              <a:t>DATIC Introduction to R Workshop</a:t>
             </a:r>
           </a:p>
           <a:p>
             <a:r>
               <a:rPr lang="en-US" dirty="0"/>
-              <a:t>July 17</a:t>
+              <a:t>Session 1: June 7</a:t>
             </a:r>
             <a:r>
               <a:rPr lang="en-US" baseline="30000" dirty="0"/>
@@ -4094,15 +4112,17 @@
             </a:r>
             <a:r>
               <a:rPr lang="en-US" dirty="0"/>
-              <a:t>, 19</a:t>
+              <a:t> and 8</a:t>
             </a:r>
             <a:r>
               <a:rPr lang="en-US" baseline="30000" dirty="0"/>
               <a:t>th</a:t>
             </a:r>
+          </a:p>
+          <a:p>
             <a:r>
               <a:rPr lang="en-US" dirty="0"/>
-              <a:t>, and 21</a:t>
+              <a:t>Session 2: June 21</a:t>
             </a:r>
             <a:r>
               <a:rPr lang="en-US" baseline="30000" dirty="0"/>
@@ -4110,8 +4130,13 @@
             </a:r>
             <a:r>
               <a:rPr lang="en-US" dirty="0"/>
-              <a:t> </a:t>
-            </a:r>
+              <a:t> and 22</a:t>
+            </a:r>
+            <a:r>
+              <a:rPr lang="en-US" baseline="30000" dirty="0"/>
+              <a:t>nd</a:t>
+            </a:r>
+            <a:endParaRPr lang="en-US" dirty="0"/>
           </a:p>
         </p:txBody>
       </p:sp>
@@ -4137,8 +4162,8 @@
         </p:blipFill>
         <p:spPr>
           <a:xfrm>
-            <a:off x="9729216" y="5715000"/>
-            <a:ext cx="2073656" cy="681914"/>
+            <a:off x="9156283" y="5526593"/>
+            <a:ext cx="2646589" cy="870321"/>
           </a:xfrm>
           <a:prstGeom prst="rect">
             <a:avLst/>
@@ -5248,14 +5273,14 @@
                 <a:gridCol w="4419894">
                   <a:extLst>
                     <a:ext uri="{9D8B030D-6E8A-4147-A177-3AD203B41FA5}">
-                      <a16:colId xmlns:a16="http://schemas.microsoft.com/office/drawing/2014/main" val="20000"/>
+                      <a16:colId xmlns:a16="http://schemas.microsoft.com/office/drawing/2014/main" xmlns="" val="20000"/>
                     </a:ext>
                   </a:extLst>
                 </a:gridCol>
                 <a:gridCol w="3622040">
                   <a:extLst>
                     <a:ext uri="{9D8B030D-6E8A-4147-A177-3AD203B41FA5}">
-                      <a16:colId xmlns:a16="http://schemas.microsoft.com/office/drawing/2014/main" val="20001"/>
+                      <a16:colId xmlns:a16="http://schemas.microsoft.com/office/drawing/2014/main" xmlns="" val="20001"/>
                     </a:ext>
                   </a:extLst>
                 </a:gridCol>
@@ -5355,7 +5380,7 @@
                 </a:tc>
                 <a:extLst>
                   <a:ext uri="{0D108BD9-81ED-4DB2-BD59-A6C34878D82A}">
-                    <a16:rowId xmlns:a16="http://schemas.microsoft.com/office/drawing/2014/main" val="10000"/>
+                    <a16:rowId xmlns:a16="http://schemas.microsoft.com/office/drawing/2014/main" xmlns="" val="10000"/>
                   </a:ext>
                 </a:extLst>
               </a:tr>
@@ -5441,7 +5466,7 @@
                 </a:tc>
                 <a:extLst>
                   <a:ext uri="{0D108BD9-81ED-4DB2-BD59-A6C34878D82A}">
-                    <a16:rowId xmlns:a16="http://schemas.microsoft.com/office/drawing/2014/main" val="10001"/>
+                    <a16:rowId xmlns:a16="http://schemas.microsoft.com/office/drawing/2014/main" xmlns="" val="10001"/>
                   </a:ext>
                 </a:extLst>
               </a:tr>
@@ -5526,7 +5551,7 @@
                 </a:tc>
                 <a:extLst>
                   <a:ext uri="{0D108BD9-81ED-4DB2-BD59-A6C34878D82A}">
-                    <a16:rowId xmlns:a16="http://schemas.microsoft.com/office/drawing/2014/main" val="10002"/>
+                    <a16:rowId xmlns:a16="http://schemas.microsoft.com/office/drawing/2014/main" xmlns="" val="10002"/>
                   </a:ext>
                 </a:extLst>
               </a:tr>
@@ -7688,21 +7713,21 @@
                 <a:gridCol w="3512365">
                   <a:extLst>
                     <a:ext uri="{9D8B030D-6E8A-4147-A177-3AD203B41FA5}">
-                      <a16:colId xmlns:a16="http://schemas.microsoft.com/office/drawing/2014/main" val="20000"/>
+                      <a16:colId xmlns:a16="http://schemas.microsoft.com/office/drawing/2014/main" xmlns="" val="20000"/>
                     </a:ext>
                   </a:extLst>
                 </a:gridCol>
                 <a:gridCol w="3468143">
                   <a:extLst>
                     <a:ext uri="{9D8B030D-6E8A-4147-A177-3AD203B41FA5}">
-                      <a16:colId xmlns:a16="http://schemas.microsoft.com/office/drawing/2014/main" val="20001"/>
+                      <a16:colId xmlns:a16="http://schemas.microsoft.com/office/drawing/2014/main" xmlns="" val="20001"/>
                     </a:ext>
                   </a:extLst>
                 </a:gridCol>
                 <a:gridCol w="3556587">
                   <a:extLst>
                     <a:ext uri="{9D8B030D-6E8A-4147-A177-3AD203B41FA5}">
-                      <a16:colId xmlns:a16="http://schemas.microsoft.com/office/drawing/2014/main" val="20002"/>
+                      <a16:colId xmlns:a16="http://schemas.microsoft.com/office/drawing/2014/main" xmlns="" val="20002"/>
                     </a:ext>
                   </a:extLst>
                 </a:gridCol>
@@ -7794,7 +7819,7 @@
                 </a:tc>
                 <a:extLst>
                   <a:ext uri="{0D108BD9-81ED-4DB2-BD59-A6C34878D82A}">
-                    <a16:rowId xmlns:a16="http://schemas.microsoft.com/office/drawing/2014/main" val="10000"/>
+                    <a16:rowId xmlns:a16="http://schemas.microsoft.com/office/drawing/2014/main" xmlns="" val="10000"/>
                   </a:ext>
                 </a:extLst>
               </a:tr>
@@ -7996,7 +8021,7 @@
                 </a:tc>
                 <a:extLst>
                   <a:ext uri="{0D108BD9-81ED-4DB2-BD59-A6C34878D82A}">
-                    <a16:rowId xmlns:a16="http://schemas.microsoft.com/office/drawing/2014/main" val="10001"/>
+                    <a16:rowId xmlns:a16="http://schemas.microsoft.com/office/drawing/2014/main" xmlns="" val="10001"/>
                   </a:ext>
                 </a:extLst>
               </a:tr>
@@ -8170,7 +8195,7 @@
                 </a:tc>
                 <a:extLst>
                   <a:ext uri="{0D108BD9-81ED-4DB2-BD59-A6C34878D82A}">
-                    <a16:rowId xmlns:a16="http://schemas.microsoft.com/office/drawing/2014/main" val="10002"/>
+                    <a16:rowId xmlns:a16="http://schemas.microsoft.com/office/drawing/2014/main" xmlns="" val="10002"/>
                   </a:ext>
                 </a:extLst>
               </a:tr>
@@ -8305,7 +8330,7 @@
                 </a:tc>
                 <a:extLst>
                   <a:ext uri="{0D108BD9-81ED-4DB2-BD59-A6C34878D82A}">
-                    <a16:rowId xmlns:a16="http://schemas.microsoft.com/office/drawing/2014/main" val="10003"/>
+                    <a16:rowId xmlns:a16="http://schemas.microsoft.com/office/drawing/2014/main" xmlns="" val="10003"/>
                   </a:ext>
                 </a:extLst>
               </a:tr>
@@ -8473,7 +8498,7 @@
                 </a:tc>
                 <a:extLst>
                   <a:ext uri="{0D108BD9-81ED-4DB2-BD59-A6C34878D82A}">
-                    <a16:rowId xmlns:a16="http://schemas.microsoft.com/office/drawing/2014/main" val="10004"/>
+                    <a16:rowId xmlns:a16="http://schemas.microsoft.com/office/drawing/2014/main" xmlns="" val="10004"/>
                   </a:ext>
                 </a:extLst>
               </a:tr>
@@ -8603,7 +8628,7 @@
                 </a:tc>
                 <a:extLst>
                   <a:ext uri="{0D108BD9-81ED-4DB2-BD59-A6C34878D82A}">
-                    <a16:rowId xmlns:a16="http://schemas.microsoft.com/office/drawing/2014/main" val="10005"/>
+                    <a16:rowId xmlns:a16="http://schemas.microsoft.com/office/drawing/2014/main" xmlns="" val="10005"/>
                   </a:ext>
                 </a:extLst>
               </a:tr>
@@ -8692,14 +8717,14 @@
                 <a:gridCol w="4419894">
                   <a:extLst>
                     <a:ext uri="{9D8B030D-6E8A-4147-A177-3AD203B41FA5}">
-                      <a16:colId xmlns:a16="http://schemas.microsoft.com/office/drawing/2014/main" val="20000"/>
+                      <a16:colId xmlns:a16="http://schemas.microsoft.com/office/drawing/2014/main" xmlns="" val="20000"/>
                     </a:ext>
                   </a:extLst>
                 </a:gridCol>
                 <a:gridCol w="3622040">
                   <a:extLst>
                     <a:ext uri="{9D8B030D-6E8A-4147-A177-3AD203B41FA5}">
-                      <a16:colId xmlns:a16="http://schemas.microsoft.com/office/drawing/2014/main" val="20001"/>
+                      <a16:colId xmlns:a16="http://schemas.microsoft.com/office/drawing/2014/main" xmlns="" val="20001"/>
                     </a:ext>
                   </a:extLst>
                 </a:gridCol>
@@ -8799,7 +8824,7 @@
                 </a:tc>
                 <a:extLst>
                   <a:ext uri="{0D108BD9-81ED-4DB2-BD59-A6C34878D82A}">
-                    <a16:rowId xmlns:a16="http://schemas.microsoft.com/office/drawing/2014/main" val="10000"/>
+                    <a16:rowId xmlns:a16="http://schemas.microsoft.com/office/drawing/2014/main" xmlns="" val="10000"/>
                   </a:ext>
                 </a:extLst>
               </a:tr>
@@ -8889,7 +8914,7 @@
                 </a:tc>
                 <a:extLst>
                   <a:ext uri="{0D108BD9-81ED-4DB2-BD59-A6C34878D82A}">
-                    <a16:rowId xmlns:a16="http://schemas.microsoft.com/office/drawing/2014/main" val="10001"/>
+                    <a16:rowId xmlns:a16="http://schemas.microsoft.com/office/drawing/2014/main" xmlns="" val="10001"/>
                   </a:ext>
                 </a:extLst>
               </a:tr>
@@ -8978,7 +9003,7 @@
                 </a:tc>
                 <a:extLst>
                   <a:ext uri="{0D108BD9-81ED-4DB2-BD59-A6C34878D82A}">
-                    <a16:rowId xmlns:a16="http://schemas.microsoft.com/office/drawing/2014/main" val="10002"/>
+                    <a16:rowId xmlns:a16="http://schemas.microsoft.com/office/drawing/2014/main" xmlns="" val="10002"/>
                   </a:ext>
                 </a:extLst>
               </a:tr>
@@ -9063,7 +9088,7 @@
                 </a:tc>
                 <a:extLst>
                   <a:ext uri="{0D108BD9-81ED-4DB2-BD59-A6C34878D82A}">
-                    <a16:rowId xmlns:a16="http://schemas.microsoft.com/office/drawing/2014/main" val="10003"/>
+                    <a16:rowId xmlns:a16="http://schemas.microsoft.com/office/drawing/2014/main" xmlns="" val="10003"/>
                   </a:ext>
                 </a:extLst>
               </a:tr>
@@ -9164,7 +9189,7 @@
                 </a:tc>
                 <a:extLst>
                   <a:ext uri="{0D108BD9-81ED-4DB2-BD59-A6C34878D82A}">
-                    <a16:rowId xmlns:a16="http://schemas.microsoft.com/office/drawing/2014/main" val="10004"/>
+                    <a16:rowId xmlns:a16="http://schemas.microsoft.com/office/drawing/2014/main" xmlns="" val="10004"/>
                   </a:ext>
                 </a:extLst>
               </a:tr>
@@ -9253,7 +9278,7 @@
                 </a:tc>
                 <a:extLst>
                   <a:ext uri="{0D108BD9-81ED-4DB2-BD59-A6C34878D82A}">
-                    <a16:rowId xmlns:a16="http://schemas.microsoft.com/office/drawing/2014/main" val="10005"/>
+                    <a16:rowId xmlns:a16="http://schemas.microsoft.com/office/drawing/2014/main" xmlns="" val="10005"/>
                   </a:ext>
                 </a:extLst>
               </a:tr>

</xml_diff>